<commit_message>
As I Work, the PowerPoint Grows...
</commit_message>
<xml_diff>
--- a/Stephen_Final_Presentation/CSLI Final Presentation Stephen Powell.pptx
+++ b/Stephen_Final_Presentation/CSLI Final Presentation Stephen Powell.pptx
@@ -7,15 +7,17 @@
   <p:sldIdLst>
     <p:sldId id="256" r:id="rId2"/>
     <p:sldId id="263" r:id="rId3"/>
-    <p:sldId id="267" r:id="rId4"/>
+    <p:sldId id="273" r:id="rId4"/>
     <p:sldId id="260" r:id="rId5"/>
-    <p:sldId id="262" r:id="rId6"/>
-    <p:sldId id="266" r:id="rId7"/>
-    <p:sldId id="264" r:id="rId8"/>
-    <p:sldId id="265" r:id="rId9"/>
-    <p:sldId id="268" r:id="rId10"/>
-    <p:sldId id="269" r:id="rId11"/>
-    <p:sldId id="270" r:id="rId12"/>
+    <p:sldId id="272" r:id="rId6"/>
+    <p:sldId id="262" r:id="rId7"/>
+    <p:sldId id="271" r:id="rId8"/>
+    <p:sldId id="264" r:id="rId9"/>
+    <p:sldId id="266" r:id="rId10"/>
+    <p:sldId id="265" r:id="rId11"/>
+    <p:sldId id="268" r:id="rId12"/>
+    <p:sldId id="269" r:id="rId13"/>
+    <p:sldId id="270" r:id="rId14"/>
   </p:sldIdLst>
   <p:sldSz cx="9144000" cy="6858000" type="screen4x3"/>
   <p:notesSz cx="6858000" cy="9144000"/>
@@ -4733,7 +4735,7 @@
           <a:p>
             <a:fld id="{361D2084-9100-45CA-96A5-41C7BC657BCD}" type="datetimeFigureOut">
               <a:rPr lang="en-US" smtClean="0"/>
-              <a:t>8/7/2015</a:t>
+              <a:t>8/10/2015</a:t>
             </a:fld>
             <a:endParaRPr lang="en-US"/>
           </a:p>
@@ -4903,7 +4905,7 @@
           <a:p>
             <a:fld id="{361D2084-9100-45CA-96A5-41C7BC657BCD}" type="datetimeFigureOut">
               <a:rPr lang="en-US" smtClean="0"/>
-              <a:t>8/7/2015</a:t>
+              <a:t>8/10/2015</a:t>
             </a:fld>
             <a:endParaRPr lang="en-US"/>
           </a:p>
@@ -5083,7 +5085,7 @@
           <a:p>
             <a:fld id="{361D2084-9100-45CA-96A5-41C7BC657BCD}" type="datetimeFigureOut">
               <a:rPr lang="en-US" smtClean="0"/>
-              <a:t>8/7/2015</a:t>
+              <a:t>8/10/2015</a:t>
             </a:fld>
             <a:endParaRPr lang="en-US"/>
           </a:p>
@@ -5253,7 +5255,7 @@
           <a:p>
             <a:fld id="{361D2084-9100-45CA-96A5-41C7BC657BCD}" type="datetimeFigureOut">
               <a:rPr lang="en-US" smtClean="0"/>
-              <a:t>8/7/2015</a:t>
+              <a:t>8/10/2015</a:t>
             </a:fld>
             <a:endParaRPr lang="en-US"/>
           </a:p>
@@ -5499,7 +5501,7 @@
           <a:p>
             <a:fld id="{361D2084-9100-45CA-96A5-41C7BC657BCD}" type="datetimeFigureOut">
               <a:rPr lang="en-US" smtClean="0"/>
-              <a:t>8/7/2015</a:t>
+              <a:t>8/10/2015</a:t>
             </a:fld>
             <a:endParaRPr lang="en-US"/>
           </a:p>
@@ -5787,7 +5789,7 @@
           <a:p>
             <a:fld id="{361D2084-9100-45CA-96A5-41C7BC657BCD}" type="datetimeFigureOut">
               <a:rPr lang="en-US" smtClean="0"/>
-              <a:t>8/7/2015</a:t>
+              <a:t>8/10/2015</a:t>
             </a:fld>
             <a:endParaRPr lang="en-US"/>
           </a:p>
@@ -6209,7 +6211,7 @@
           <a:p>
             <a:fld id="{361D2084-9100-45CA-96A5-41C7BC657BCD}" type="datetimeFigureOut">
               <a:rPr lang="en-US" smtClean="0"/>
-              <a:t>8/7/2015</a:t>
+              <a:t>8/10/2015</a:t>
             </a:fld>
             <a:endParaRPr lang="en-US"/>
           </a:p>
@@ -6327,7 +6329,7 @@
           <a:p>
             <a:fld id="{361D2084-9100-45CA-96A5-41C7BC657BCD}" type="datetimeFigureOut">
               <a:rPr lang="en-US" smtClean="0"/>
-              <a:t>8/7/2015</a:t>
+              <a:t>8/10/2015</a:t>
             </a:fld>
             <a:endParaRPr lang="en-US"/>
           </a:p>
@@ -6422,7 +6424,7 @@
           <a:p>
             <a:fld id="{361D2084-9100-45CA-96A5-41C7BC657BCD}" type="datetimeFigureOut">
               <a:rPr lang="en-US" smtClean="0"/>
-              <a:t>8/7/2015</a:t>
+              <a:t>8/10/2015</a:t>
             </a:fld>
             <a:endParaRPr lang="en-US"/>
           </a:p>
@@ -6699,7 +6701,7 @@
           <a:p>
             <a:fld id="{361D2084-9100-45CA-96A5-41C7BC657BCD}" type="datetimeFigureOut">
               <a:rPr lang="en-US" smtClean="0"/>
-              <a:t>8/7/2015</a:t>
+              <a:t>8/10/2015</a:t>
             </a:fld>
             <a:endParaRPr lang="en-US"/>
           </a:p>
@@ -6952,7 +6954,7 @@
           <a:p>
             <a:fld id="{361D2084-9100-45CA-96A5-41C7BC657BCD}" type="datetimeFigureOut">
               <a:rPr lang="en-US" smtClean="0"/>
-              <a:t>8/7/2015</a:t>
+              <a:t>8/10/2015</a:t>
             </a:fld>
             <a:endParaRPr lang="en-US"/>
           </a:p>
@@ -7189,7 +7191,7 @@
           <a:p>
             <a:fld id="{361D2084-9100-45CA-96A5-41C7BC657BCD}" type="datetimeFigureOut">
               <a:rPr lang="en-US" smtClean="0"/>
-              <a:t>8/7/2015</a:t>
+              <a:t>8/10/2015</a:t>
             </a:fld>
             <a:endParaRPr lang="en-US"/>
           </a:p>
@@ -7594,6 +7596,52 @@
       </p:grpSpPr>
       <p:sp>
         <p:nvSpPr>
+          <p:cNvPr id="4" name="Rounded Rectangle 3"/>
+          <p:cNvSpPr/>
+          <p:nvPr/>
+        </p:nvSpPr>
+        <p:spPr>
+          <a:xfrm>
+            <a:off x="647700" y="1820917"/>
+            <a:ext cx="7848600" cy="2057400"/>
+          </a:xfrm>
+          <a:prstGeom prst="roundRect">
+            <a:avLst/>
+          </a:prstGeom>
+          <a:solidFill>
+            <a:schemeClr val="accent1">
+              <a:lumMod val="60000"/>
+              <a:lumOff val="40000"/>
+            </a:schemeClr>
+          </a:solidFill>
+        </p:spPr>
+        <p:style>
+          <a:lnRef idx="2">
+            <a:schemeClr val="accent1">
+              <a:shade val="50000"/>
+            </a:schemeClr>
+          </a:lnRef>
+          <a:fillRef idx="1">
+            <a:schemeClr val="accent1"/>
+          </a:fillRef>
+          <a:effectRef idx="0">
+            <a:schemeClr val="accent1"/>
+          </a:effectRef>
+          <a:fontRef idx="minor">
+            <a:schemeClr val="lt1"/>
+          </a:fontRef>
+        </p:style>
+        <p:txBody>
+          <a:bodyPr rtlCol="0" anchor="ctr"/>
+          <a:lstStyle/>
+          <a:p>
+            <a:pPr algn="ctr"/>
+            <a:endParaRPr lang="en-US"/>
+          </a:p>
+        </p:txBody>
+      </p:sp>
+      <p:sp>
+        <p:nvSpPr>
           <p:cNvPr id="2" name="Title 1"/>
           <p:cNvSpPr>
             <a:spLocks noGrp="1"/>
@@ -7609,7 +7657,19 @@
           <a:p>
             <a:r>
               <a:rPr lang="en-US" b="1" dirty="0" smtClean="0"/>
-              <a:t>Inhibition in Children’s Games</a:t>
+              <a:t>Inhibitory Control </a:t>
+            </a:r>
+            <a:r>
+              <a:rPr lang="en-US" b="1" dirty="0" smtClean="0"/>
+              <a:t>in </a:t>
+            </a:r>
+            <a:r>
+              <a:rPr lang="en-US" b="1" dirty="0" smtClean="0"/>
+              <a:t>Language </a:t>
+            </a:r>
+            <a:r>
+              <a:rPr lang="en-US" b="1" dirty="0" smtClean="0"/>
+              <a:t>Games</a:t>
             </a:r>
             <a:endParaRPr lang="en-US" b="1" dirty="0"/>
           </a:p>
@@ -7625,7 +7685,12 @@
             <p:ph type="subTitle" idx="1"/>
           </p:nvPr>
         </p:nvSpPr>
-        <p:spPr/>
+        <p:spPr>
+          <a:xfrm>
+            <a:off x="1371600" y="4114800"/>
+            <a:ext cx="6400800" cy="1752600"/>
+          </a:xfrm>
+        </p:spPr>
         <p:txBody>
           <a:bodyPr/>
           <a:lstStyle/>
@@ -7634,8 +7699,8 @@
               <a:rPr lang="en-US" dirty="0" smtClean="0">
                 <a:solidFill>
                   <a:schemeClr val="tx1">
-                    <a:lumMod val="75000"/>
-                    <a:lumOff val="25000"/>
+                    <a:lumMod val="85000"/>
+                    <a:lumOff val="15000"/>
                   </a:schemeClr>
                 </a:solidFill>
               </a:rPr>
@@ -7647,8 +7712,8 @@
               <a:rPr lang="en-US" dirty="0" smtClean="0">
                 <a:solidFill>
                   <a:schemeClr val="tx1">
-                    <a:lumMod val="75000"/>
-                    <a:lumOff val="25000"/>
+                    <a:lumMod val="85000"/>
+                    <a:lumOff val="15000"/>
                   </a:schemeClr>
                 </a:solidFill>
               </a:rPr>
@@ -7660,8 +7725,8 @@
               <a:rPr lang="en-US" dirty="0" smtClean="0">
                 <a:solidFill>
                   <a:schemeClr val="tx1">
-                    <a:lumMod val="75000"/>
-                    <a:lumOff val="25000"/>
+                    <a:lumMod val="85000"/>
+                    <a:lumOff val="15000"/>
                   </a:schemeClr>
                 </a:solidFill>
               </a:rPr>
@@ -7671,8 +7736,8 @@
               <a:rPr lang="en-US" baseline="30000" dirty="0" smtClean="0">
                 <a:solidFill>
                   <a:schemeClr val="tx1">
-                    <a:lumMod val="75000"/>
-                    <a:lumOff val="25000"/>
+                    <a:lumMod val="85000"/>
+                    <a:lumOff val="15000"/>
                   </a:schemeClr>
                 </a:solidFill>
               </a:rPr>
@@ -7682,8 +7747,8 @@
               <a:rPr lang="en-US" dirty="0" smtClean="0">
                 <a:solidFill>
                   <a:schemeClr val="tx1">
-                    <a:lumMod val="75000"/>
-                    <a:lumOff val="25000"/>
+                    <a:lumMod val="85000"/>
+                    <a:lumOff val="15000"/>
                   </a:schemeClr>
                 </a:solidFill>
               </a:rPr>
@@ -7692,8 +7757,8 @@
             <a:endParaRPr lang="en-US" dirty="0">
               <a:solidFill>
                 <a:schemeClr val="tx1">
-                  <a:lumMod val="75000"/>
-                  <a:lumOff val="25000"/>
+                  <a:lumMod val="85000"/>
+                  <a:lumOff val="15000"/>
                 </a:schemeClr>
               </a:solidFill>
             </a:endParaRPr>
@@ -7749,12 +7814,14 @@
         </p:nvSpPr>
         <p:spPr/>
         <p:txBody>
-          <a:bodyPr/>
+          <a:bodyPr>
+            <a:normAutofit/>
+          </a:bodyPr>
           <a:lstStyle/>
           <a:p>
             <a:r>
               <a:rPr lang="en-US" dirty="0" smtClean="0"/>
-              <a:t>Conclusions</a:t>
+              <a:t>Children’s Results</a:t>
             </a:r>
             <a:endParaRPr lang="en-US" dirty="0"/>
           </a:p>
@@ -7775,7 +7842,390 @@
           <a:bodyPr/>
           <a:lstStyle/>
           <a:p>
+            <a:r>
+              <a:rPr lang="en-US" dirty="0"/>
+              <a:t>“General RT &amp; Accuracy Data”</a:t>
+            </a:r>
+          </a:p>
+          <a:p>
+            <a:r>
+              <a:rPr lang="en-US" dirty="0"/>
+              <a:t>Correlation of </a:t>
+            </a:r>
+            <a:r>
+              <a:rPr lang="en-US" dirty="0" err="1"/>
+              <a:t>Inhib</a:t>
+            </a:r>
+            <a:r>
+              <a:rPr lang="en-US" dirty="0"/>
+              <a:t> to 1) </a:t>
+            </a:r>
+            <a:r>
+              <a:rPr lang="en-US" dirty="0" err="1"/>
+              <a:t>Neg</a:t>
+            </a:r>
+            <a:r>
+              <a:rPr lang="en-US" dirty="0"/>
+              <a:t> &amp; 2) </a:t>
+            </a:r>
+            <a:r>
+              <a:rPr lang="en-US" dirty="0" err="1"/>
+              <a:t>Implic</a:t>
+            </a:r>
+            <a:endParaRPr lang="en-US" dirty="0"/>
+          </a:p>
+          <a:p>
+            <a:endParaRPr lang="en-US" dirty="0"/>
+          </a:p>
+        </p:txBody>
+      </p:sp>
+    </p:spTree>
+    <p:extLst>
+      <p:ext uri="{BB962C8B-B14F-4D97-AF65-F5344CB8AC3E}">
+        <p14:creationId xmlns:p14="http://schemas.microsoft.com/office/powerpoint/2010/main" val="947664464"/>
+      </p:ext>
+    </p:extLst>
+  </p:cSld>
+  <p:clrMapOvr>
+    <a:masterClrMapping/>
+  </p:clrMapOvr>
+  <p:timing>
+    <p:tnLst>
+      <p:par>
+        <p:cTn id="1" dur="indefinite" restart="never" nodeType="tmRoot"/>
+      </p:par>
+    </p:tnLst>
+  </p:timing>
+</p:sld>
+</file>
+
+<file path=ppt/slides/slide11.xml><?xml version="1.0" encoding="utf-8"?>
+<p:sld xmlns:a="http://schemas.openxmlformats.org/drawingml/2006/main" xmlns:r="http://schemas.openxmlformats.org/officeDocument/2006/relationships" xmlns:p="http://schemas.openxmlformats.org/presentationml/2006/main">
+  <p:cSld>
+    <p:spTree>
+      <p:nvGrpSpPr>
+        <p:cNvPr id="1" name=""/>
+        <p:cNvGrpSpPr/>
+        <p:nvPr/>
+      </p:nvGrpSpPr>
+      <p:grpSpPr>
+        <a:xfrm>
+          <a:off x="0" y="0"/>
+          <a:ext cx="0" cy="0"/>
+          <a:chOff x="0" y="0"/>
+          <a:chExt cx="0" cy="0"/>
+        </a:xfrm>
+      </p:grpSpPr>
+      <p:sp>
+        <p:nvSpPr>
+          <p:cNvPr id="11" name="Rounded Rectangle 10"/>
+          <p:cNvSpPr/>
+          <p:nvPr/>
+        </p:nvSpPr>
+        <p:spPr>
+          <a:xfrm>
+            <a:off x="4648200" y="1371600"/>
+            <a:ext cx="4038600" cy="5105400"/>
+          </a:xfrm>
+          <a:prstGeom prst="roundRect">
+            <a:avLst/>
+          </a:prstGeom>
+          <a:solidFill>
+            <a:schemeClr val="accent2">
+              <a:lumMod val="40000"/>
+              <a:lumOff val="60000"/>
+            </a:schemeClr>
+          </a:solidFill>
+        </p:spPr>
+        <p:style>
+          <a:lnRef idx="2">
+            <a:schemeClr val="accent1">
+              <a:shade val="50000"/>
+            </a:schemeClr>
+          </a:lnRef>
+          <a:fillRef idx="1">
+            <a:schemeClr val="accent1"/>
+          </a:fillRef>
+          <a:effectRef idx="0">
+            <a:schemeClr val="accent1"/>
+          </a:effectRef>
+          <a:fontRef idx="minor">
+            <a:schemeClr val="lt1"/>
+          </a:fontRef>
+        </p:style>
+        <p:txBody>
+          <a:bodyPr rtlCol="0" anchor="ctr"/>
+          <a:lstStyle/>
+          <a:p>
+            <a:pPr algn="ctr"/>
             <a:endParaRPr lang="en-US"/>
+          </a:p>
+        </p:txBody>
+      </p:sp>
+      <p:sp>
+        <p:nvSpPr>
+          <p:cNvPr id="9" name="Rounded Rectangle 8"/>
+          <p:cNvSpPr/>
+          <p:nvPr/>
+        </p:nvSpPr>
+        <p:spPr>
+          <a:xfrm>
+            <a:off x="457200" y="1371600"/>
+            <a:ext cx="4038600" cy="5105400"/>
+          </a:xfrm>
+          <a:prstGeom prst="roundRect">
+            <a:avLst/>
+          </a:prstGeom>
+          <a:solidFill>
+            <a:schemeClr val="accent4">
+              <a:lumMod val="40000"/>
+              <a:lumOff val="60000"/>
+            </a:schemeClr>
+          </a:solidFill>
+        </p:spPr>
+        <p:style>
+          <a:lnRef idx="2">
+            <a:schemeClr val="accent1">
+              <a:shade val="50000"/>
+            </a:schemeClr>
+          </a:lnRef>
+          <a:fillRef idx="1">
+            <a:schemeClr val="accent1"/>
+          </a:fillRef>
+          <a:effectRef idx="0">
+            <a:schemeClr val="accent1"/>
+          </a:effectRef>
+          <a:fontRef idx="minor">
+            <a:schemeClr val="lt1"/>
+          </a:fontRef>
+        </p:style>
+        <p:txBody>
+          <a:bodyPr rtlCol="0" anchor="ctr"/>
+          <a:lstStyle/>
+          <a:p>
+            <a:pPr algn="ctr"/>
+            <a:endParaRPr lang="en-US"/>
+          </a:p>
+        </p:txBody>
+      </p:sp>
+      <p:sp>
+        <p:nvSpPr>
+          <p:cNvPr id="2" name="Title 1"/>
+          <p:cNvSpPr>
+            <a:spLocks noGrp="1"/>
+          </p:cNvSpPr>
+          <p:nvPr>
+            <p:ph type="title"/>
+          </p:nvPr>
+        </p:nvSpPr>
+        <p:spPr/>
+        <p:txBody>
+          <a:bodyPr/>
+          <a:lstStyle/>
+          <a:p>
+            <a:r>
+              <a:rPr lang="en-US" dirty="0" smtClean="0"/>
+              <a:t>Compare to Prior Work</a:t>
+            </a:r>
+            <a:endParaRPr lang="en-US" dirty="0"/>
+          </a:p>
+        </p:txBody>
+      </p:sp>
+      <p:sp>
+        <p:nvSpPr>
+          <p:cNvPr id="4" name="Text Placeholder 3"/>
+          <p:cNvSpPr>
+            <a:spLocks noGrp="1"/>
+          </p:cNvSpPr>
+          <p:nvPr>
+            <p:ph type="body" idx="1"/>
+          </p:nvPr>
+        </p:nvSpPr>
+        <p:spPr/>
+        <p:txBody>
+          <a:bodyPr>
+            <a:normAutofit/>
+          </a:bodyPr>
+          <a:lstStyle/>
+          <a:p>
+            <a:pPr algn="ctr"/>
+            <a:r>
+              <a:rPr lang="en-US" sz="2800" u="sng" dirty="0" smtClean="0"/>
+              <a:t>Ad Hoc Implicature</a:t>
+            </a:r>
+            <a:endParaRPr lang="en-US" sz="2800" u="sng" dirty="0"/>
+          </a:p>
+        </p:txBody>
+      </p:sp>
+      <p:sp>
+        <p:nvSpPr>
+          <p:cNvPr id="5" name="Content Placeholder 4"/>
+          <p:cNvSpPr>
+            <a:spLocks noGrp="1"/>
+          </p:cNvSpPr>
+          <p:nvPr>
+            <p:ph sz="half" idx="2"/>
+          </p:nvPr>
+        </p:nvSpPr>
+        <p:spPr/>
+        <p:txBody>
+          <a:bodyPr/>
+          <a:lstStyle/>
+          <a:p>
+            <a:endParaRPr lang="en-US"/>
+          </a:p>
+        </p:txBody>
+      </p:sp>
+      <p:sp>
+        <p:nvSpPr>
+          <p:cNvPr id="6" name="Text Placeholder 5"/>
+          <p:cNvSpPr>
+            <a:spLocks noGrp="1"/>
+          </p:cNvSpPr>
+          <p:nvPr>
+            <p:ph type="body" sz="quarter" idx="3"/>
+          </p:nvPr>
+        </p:nvSpPr>
+        <p:spPr/>
+        <p:txBody>
+          <a:bodyPr>
+            <a:normAutofit/>
+          </a:bodyPr>
+          <a:lstStyle/>
+          <a:p>
+            <a:pPr algn="ctr"/>
+            <a:r>
+              <a:rPr lang="en-US" sz="2800" u="sng" dirty="0" smtClean="0"/>
+              <a:t>Negation</a:t>
+            </a:r>
+            <a:endParaRPr lang="en-US" sz="2800" u="sng" dirty="0"/>
+          </a:p>
+        </p:txBody>
+      </p:sp>
+      <p:sp>
+        <p:nvSpPr>
+          <p:cNvPr id="7" name="Content Placeholder 6"/>
+          <p:cNvSpPr>
+            <a:spLocks noGrp="1"/>
+          </p:cNvSpPr>
+          <p:nvPr>
+            <p:ph sz="quarter" idx="4"/>
+          </p:nvPr>
+        </p:nvSpPr>
+        <p:spPr/>
+        <p:txBody>
+          <a:bodyPr/>
+          <a:lstStyle/>
+          <a:p>
+            <a:endParaRPr lang="en-US" dirty="0"/>
+          </a:p>
+        </p:txBody>
+      </p:sp>
+    </p:spTree>
+    <p:extLst>
+      <p:ext uri="{BB962C8B-B14F-4D97-AF65-F5344CB8AC3E}">
+        <p14:creationId xmlns:p14="http://schemas.microsoft.com/office/powerpoint/2010/main" val="2989530057"/>
+      </p:ext>
+    </p:extLst>
+  </p:cSld>
+  <p:clrMapOvr>
+    <a:masterClrMapping/>
+  </p:clrMapOvr>
+  <p:timing>
+    <p:tnLst>
+      <p:par>
+        <p:cTn id="1" dur="indefinite" restart="never" nodeType="tmRoot"/>
+      </p:par>
+    </p:tnLst>
+  </p:timing>
+</p:sld>
+</file>
+
+<file path=ppt/slides/slide12.xml><?xml version="1.0" encoding="utf-8"?>
+<p:sld xmlns:a="http://schemas.openxmlformats.org/drawingml/2006/main" xmlns:r="http://schemas.openxmlformats.org/officeDocument/2006/relationships" xmlns:p="http://schemas.openxmlformats.org/presentationml/2006/main">
+  <p:cSld>
+    <p:spTree>
+      <p:nvGrpSpPr>
+        <p:cNvPr id="1" name=""/>
+        <p:cNvGrpSpPr/>
+        <p:nvPr/>
+      </p:nvGrpSpPr>
+      <p:grpSpPr>
+        <a:xfrm>
+          <a:off x="0" y="0"/>
+          <a:ext cx="0" cy="0"/>
+          <a:chOff x="0" y="0"/>
+          <a:chExt cx="0" cy="0"/>
+        </a:xfrm>
+      </p:grpSpPr>
+      <p:sp>
+        <p:nvSpPr>
+          <p:cNvPr id="2" name="Title 1"/>
+          <p:cNvSpPr>
+            <a:spLocks noGrp="1"/>
+          </p:cNvSpPr>
+          <p:nvPr>
+            <p:ph type="title"/>
+          </p:nvPr>
+        </p:nvSpPr>
+        <p:spPr/>
+        <p:txBody>
+          <a:bodyPr>
+            <a:normAutofit/>
+          </a:bodyPr>
+          <a:lstStyle/>
+          <a:p>
+            <a:r>
+              <a:rPr lang="en-US" dirty="0" smtClean="0"/>
+              <a:t>Future Directions</a:t>
+            </a:r>
+            <a:endParaRPr lang="en-US" dirty="0"/>
+          </a:p>
+        </p:txBody>
+      </p:sp>
+      <p:sp>
+        <p:nvSpPr>
+          <p:cNvPr id="3" name="Content Placeholder 2"/>
+          <p:cNvSpPr>
+            <a:spLocks noGrp="1"/>
+          </p:cNvSpPr>
+          <p:nvPr>
+            <p:ph idx="1"/>
+          </p:nvPr>
+        </p:nvSpPr>
+        <p:spPr/>
+        <p:txBody>
+          <a:bodyPr/>
+          <a:lstStyle/>
+          <a:p>
+            <a:r>
+              <a:rPr lang="en-US" dirty="0" smtClean="0"/>
+              <a:t>Game was redesigned</a:t>
+            </a:r>
+          </a:p>
+          <a:p>
+            <a:r>
+              <a:rPr lang="en-US" dirty="0" smtClean="0"/>
+              <a:t>Currently on Mechanical Turk</a:t>
+            </a:r>
+          </a:p>
+          <a:p>
+            <a:r>
+              <a:rPr lang="en-US" dirty="0" smtClean="0"/>
+              <a:t>Reintroduce redesigned game to Bing</a:t>
+            </a:r>
+          </a:p>
+          <a:p>
+            <a:endParaRPr lang="en-US" dirty="0"/>
+          </a:p>
+          <a:p>
+            <a:r>
+              <a:rPr lang="en-US" b="1" dirty="0" smtClean="0"/>
+              <a:t>PERHAPS THIS SECTION IS MOOT WITH THE NEWEST RESULTS??? Ask Ann… </a:t>
+            </a:r>
+          </a:p>
+          <a:p>
+            <a:endParaRPr lang="en-US" dirty="0"/>
           </a:p>
         </p:txBody>
       </p:sp>
@@ -7789,10 +8239,17 @@
   <p:clrMapOvr>
     <a:masterClrMapping/>
   </p:clrMapOvr>
+  <p:timing>
+    <p:tnLst>
+      <p:par>
+        <p:cTn id="1" dur="indefinite" restart="never" nodeType="tmRoot"/>
+      </p:par>
+    </p:tnLst>
+  </p:timing>
 </p:sld>
 </file>
 
-<file path=ppt/slides/slide11.xml><?xml version="1.0" encoding="utf-8"?>
+<file path=ppt/slides/slide13.xml><?xml version="1.0" encoding="utf-8"?>
 <p:sld xmlns:a="http://schemas.openxmlformats.org/drawingml/2006/main" xmlns:r="http://schemas.openxmlformats.org/officeDocument/2006/relationships" xmlns:p="http://schemas.openxmlformats.org/presentationml/2006/main">
   <p:cSld>
     <p:spTree>
@@ -7826,28 +8283,335 @@
           <a:p>
             <a:r>
               <a:rPr lang="en-US" dirty="0" smtClean="0"/>
-              <a:t>Thanks To…</a:t>
+              <a:t>A Specia</a:t>
+            </a:r>
+            <a:r>
+              <a:rPr lang="en-US" dirty="0" smtClean="0"/>
+              <a:t>l </a:t>
+            </a:r>
+            <a:r>
+              <a:rPr lang="en-US" dirty="0" smtClean="0"/>
+              <a:t>Thanks </a:t>
+            </a:r>
+            <a:r>
+              <a:rPr lang="en-US" dirty="0" smtClean="0"/>
+              <a:t>To…</a:t>
             </a:r>
             <a:endParaRPr lang="en-US" dirty="0"/>
+          </a:p>
+        </p:txBody>
+      </p:sp>
+      <p:pic>
+        <p:nvPicPr>
+          <p:cNvPr id="4" name="Content Placeholder 3"/>
+          <p:cNvPicPr>
+            <a:picLocks noGrp="1" noChangeAspect="1"/>
+          </p:cNvPicPr>
+          <p:nvPr>
+            <p:ph idx="1"/>
+          </p:nvPr>
+        </p:nvPicPr>
+        <p:blipFill>
+          <a:blip r:embed="rId2">
+            <a:extLst>
+              <a:ext uri="{28A0092B-C50C-407E-A947-70E740481C1C}">
+                <a14:useLocalDpi xmlns:a14="http://schemas.microsoft.com/office/drawing/2010/main" val="0"/>
+              </a:ext>
+            </a:extLst>
+          </a:blip>
+          <a:stretch>
+            <a:fillRect/>
+          </a:stretch>
+        </p:blipFill>
+        <p:spPr>
+          <a:xfrm>
+            <a:off x="609600" y="1346728"/>
+            <a:ext cx="2286000" cy="2286000"/>
+          </a:xfrm>
+        </p:spPr>
+      </p:pic>
+      <p:pic>
+        <p:nvPicPr>
+          <p:cNvPr id="5" name="Picture 4"/>
+          <p:cNvPicPr>
+            <a:picLocks noChangeAspect="1"/>
+          </p:cNvPicPr>
+          <p:nvPr/>
+        </p:nvPicPr>
+        <p:blipFill>
+          <a:blip r:embed="rId3" cstate="print">
+            <a:extLst>
+              <a:ext uri="{28A0092B-C50C-407E-A947-70E740481C1C}">
+                <a14:useLocalDpi xmlns:a14="http://schemas.microsoft.com/office/drawing/2010/main" val="0"/>
+              </a:ext>
+            </a:extLst>
+          </a:blip>
+          <a:stretch>
+            <a:fillRect/>
+          </a:stretch>
+        </p:blipFill>
+        <p:spPr>
+          <a:xfrm>
+            <a:off x="6563226" y="4115086"/>
+            <a:ext cx="1742574" cy="2285714"/>
+          </a:xfrm>
+          <a:prstGeom prst="rect">
+            <a:avLst/>
+          </a:prstGeom>
+        </p:spPr>
+      </p:pic>
+      <p:pic>
+        <p:nvPicPr>
+          <p:cNvPr id="6" name="Picture 5"/>
+          <p:cNvPicPr>
+            <a:picLocks noChangeAspect="1"/>
+          </p:cNvPicPr>
+          <p:nvPr/>
+        </p:nvPicPr>
+        <p:blipFill>
+          <a:blip r:embed="rId4">
+            <a:extLst>
+              <a:ext uri="{28A0092B-C50C-407E-A947-70E740481C1C}">
+                <a14:useLocalDpi xmlns:a14="http://schemas.microsoft.com/office/drawing/2010/main" val="0"/>
+              </a:ext>
+            </a:extLst>
+          </a:blip>
+          <a:stretch>
+            <a:fillRect/>
+          </a:stretch>
+        </p:blipFill>
+        <p:spPr>
+          <a:xfrm>
+            <a:off x="3200400" y="2581656"/>
+            <a:ext cx="2743200" cy="2218944"/>
+          </a:xfrm>
+          <a:prstGeom prst="rect">
+            <a:avLst/>
+          </a:prstGeom>
+        </p:spPr>
+      </p:pic>
+      <p:pic>
+        <p:nvPicPr>
+          <p:cNvPr id="7" name="Picture 6"/>
+          <p:cNvPicPr>
+            <a:picLocks noChangeAspect="1"/>
+          </p:cNvPicPr>
+          <p:nvPr/>
+        </p:nvPicPr>
+        <p:blipFill>
+          <a:blip r:embed="rId5">
+            <a:extLst>
+              <a:ext uri="{28A0092B-C50C-407E-A947-70E740481C1C}">
+                <a14:useLocalDpi xmlns:a14="http://schemas.microsoft.com/office/drawing/2010/main" val="0"/>
+              </a:ext>
+            </a:extLst>
+          </a:blip>
+          <a:stretch>
+            <a:fillRect/>
+          </a:stretch>
+        </p:blipFill>
+        <p:spPr>
+          <a:xfrm>
+            <a:off x="609600" y="4118201"/>
+            <a:ext cx="2286000" cy="2286000"/>
+          </a:xfrm>
+          <a:prstGeom prst="rect">
+            <a:avLst/>
+          </a:prstGeom>
+        </p:spPr>
+      </p:pic>
+      <p:pic>
+        <p:nvPicPr>
+          <p:cNvPr id="1026" name="Picture 2"/>
+          <p:cNvPicPr>
+            <a:picLocks noChangeAspect="1" noChangeArrowheads="1"/>
+          </p:cNvPicPr>
+          <p:nvPr/>
+        </p:nvPicPr>
+        <p:blipFill>
+          <a:blip r:embed="rId6">
+            <a:extLst>
+              <a:ext uri="{28A0092B-C50C-407E-A947-70E740481C1C}">
+                <a14:useLocalDpi xmlns:a14="http://schemas.microsoft.com/office/drawing/2010/main" val="0"/>
+              </a:ext>
+            </a:extLst>
+          </a:blip>
+          <a:stretch>
+            <a:fillRect/>
+          </a:stretch>
+        </p:blipFill>
+        <p:spPr bwMode="auto">
+          <a:xfrm>
+            <a:off x="6248400" y="1344168"/>
+            <a:ext cx="2279650" cy="2279650"/>
+          </a:xfrm>
+          <a:prstGeom prst="rect">
+            <a:avLst/>
+          </a:prstGeom>
+          <a:noFill/>
+          <a:ln>
+            <a:noFill/>
+          </a:ln>
+          <a:effectLst/>
+          <a:extLst>
+            <a:ext uri="{909E8E84-426E-40DD-AFC4-6F175D3DCCD1}">
+              <a14:hiddenFill xmlns:a14="http://schemas.microsoft.com/office/drawing/2010/main">
+                <a:solidFill>
+                  <a:schemeClr val="accent1"/>
+                </a:solidFill>
+              </a14:hiddenFill>
+            </a:ext>
+            <a:ext uri="{91240B29-F687-4F45-9708-019B960494DF}">
+              <a14:hiddenLine xmlns:a14="http://schemas.microsoft.com/office/drawing/2010/main" w="9525">
+                <a:solidFill>
+                  <a:schemeClr val="tx1"/>
+                </a:solidFill>
+                <a:miter lim="800000"/>
+                <a:headEnd/>
+                <a:tailEnd/>
+              </a14:hiddenLine>
+            </a:ext>
+            <a:ext uri="{AF507438-7753-43E0-B8FC-AC1667EBCBE1}">
+              <a14:hiddenEffects xmlns:a14="http://schemas.microsoft.com/office/drawing/2010/main">
+                <a:effectLst>
+                  <a:outerShdw dist="35921" dir="2700000" algn="ctr" rotWithShape="0">
+                    <a:schemeClr val="bg2"/>
+                  </a:outerShdw>
+                </a:effectLst>
+              </a14:hiddenEffects>
+            </a:ext>
+          </a:extLst>
+        </p:spPr>
+      </p:pic>
+      <p:sp>
+        <p:nvSpPr>
+          <p:cNvPr id="8" name="Rectangle 7"/>
+          <p:cNvSpPr/>
+          <p:nvPr/>
+        </p:nvSpPr>
+        <p:spPr>
+          <a:xfrm>
+            <a:off x="685800" y="3124200"/>
+            <a:ext cx="2133600" cy="454025"/>
+          </a:xfrm>
+          <a:prstGeom prst="rect">
+            <a:avLst/>
+          </a:prstGeom>
+        </p:spPr>
+        <p:style>
+          <a:lnRef idx="2">
+            <a:schemeClr val="accent1">
+              <a:shade val="50000"/>
+            </a:schemeClr>
+          </a:lnRef>
+          <a:fillRef idx="1">
+            <a:schemeClr val="accent1"/>
+          </a:fillRef>
+          <a:effectRef idx="0">
+            <a:schemeClr val="accent1"/>
+          </a:effectRef>
+          <a:fontRef idx="minor">
+            <a:schemeClr val="lt1"/>
+          </a:fontRef>
+        </p:style>
+        <p:txBody>
+          <a:bodyPr rtlCol="0" anchor="ctr"/>
+          <a:lstStyle/>
+          <a:p>
+            <a:pPr algn="ctr"/>
+            <a:r>
+              <a:rPr lang="en-US" sz="2000" b="1" dirty="0" smtClean="0"/>
+              <a:t>Ann Nordmeyer</a:t>
+            </a:r>
+            <a:endParaRPr lang="en-US" sz="2000" b="1" dirty="0"/>
           </a:p>
         </p:txBody>
       </p:sp>
       <p:sp>
         <p:nvSpPr>
-          <p:cNvPr id="3" name="Content Placeholder 2"/>
-          <p:cNvSpPr>
-            <a:spLocks noGrp="1"/>
-          </p:cNvSpPr>
-          <p:nvPr>
-            <p:ph idx="1"/>
-          </p:nvPr>
+          <p:cNvPr id="10" name="Rectangle 9"/>
+          <p:cNvSpPr/>
+          <p:nvPr/>
         </p:nvSpPr>
-        <p:spPr/>
+        <p:spPr>
+          <a:xfrm>
+            <a:off x="6324600" y="3127375"/>
+            <a:ext cx="2133600" cy="454025"/>
+          </a:xfrm>
+          <a:prstGeom prst="rect">
+            <a:avLst/>
+          </a:prstGeom>
+        </p:spPr>
+        <p:style>
+          <a:lnRef idx="2">
+            <a:schemeClr val="accent1">
+              <a:shade val="50000"/>
+            </a:schemeClr>
+          </a:lnRef>
+          <a:fillRef idx="1">
+            <a:schemeClr val="accent1"/>
+          </a:fillRef>
+          <a:effectRef idx="0">
+            <a:schemeClr val="accent1"/>
+          </a:effectRef>
+          <a:fontRef idx="minor">
+            <a:schemeClr val="lt1"/>
+          </a:fontRef>
+        </p:style>
         <p:txBody>
-          <a:bodyPr/>
+          <a:bodyPr rtlCol="0" anchor="ctr"/>
           <a:lstStyle/>
           <a:p>
-            <a:endParaRPr lang="en-US"/>
+            <a:pPr algn="ctr"/>
+            <a:r>
+              <a:rPr lang="en-US" sz="2000" b="1" dirty="0" smtClean="0"/>
+              <a:t>Erica Yoon</a:t>
+            </a:r>
+            <a:endParaRPr lang="en-US" sz="2000" b="1" dirty="0"/>
+          </a:p>
+        </p:txBody>
+      </p:sp>
+      <p:sp>
+        <p:nvSpPr>
+          <p:cNvPr id="12" name="Rectangle 11"/>
+          <p:cNvSpPr/>
+          <p:nvPr/>
+        </p:nvSpPr>
+        <p:spPr>
+          <a:xfrm>
+            <a:off x="6367713" y="5867400"/>
+            <a:ext cx="2133600" cy="454025"/>
+          </a:xfrm>
+          <a:prstGeom prst="rect">
+            <a:avLst/>
+          </a:prstGeom>
+        </p:spPr>
+        <p:style>
+          <a:lnRef idx="2">
+            <a:schemeClr val="accent1">
+              <a:shade val="50000"/>
+            </a:schemeClr>
+          </a:lnRef>
+          <a:fillRef idx="1">
+            <a:schemeClr val="accent1"/>
+          </a:fillRef>
+          <a:effectRef idx="0">
+            <a:schemeClr val="accent1"/>
+          </a:effectRef>
+          <a:fontRef idx="minor">
+            <a:schemeClr val="lt1"/>
+          </a:fontRef>
+        </p:style>
+        <p:txBody>
+          <a:bodyPr rtlCol="0" anchor="ctr"/>
+          <a:lstStyle/>
+          <a:p>
+            <a:pPr algn="ctr"/>
+            <a:r>
+              <a:rPr lang="en-US" sz="2000" b="1" dirty="0" smtClean="0"/>
+              <a:t>Katherine Kaiser</a:t>
+            </a:r>
+            <a:endParaRPr lang="en-US" sz="2000" b="1" dirty="0"/>
           </a:p>
         </p:txBody>
       </p:sp>
@@ -7861,6 +8625,13 @@
   <p:clrMapOvr>
     <a:masterClrMapping/>
   </p:clrMapOvr>
+  <p:timing>
+    <p:tnLst>
+      <p:par>
+        <p:cTn id="1" dur="indefinite" restart="never" nodeType="tmRoot"/>
+      </p:par>
+    </p:tnLst>
+  </p:timing>
 </p:sld>
 </file>
 
@@ -7923,13 +8694,18 @@
           <a:p>
             <a:r>
               <a:rPr lang="en-US" dirty="0" smtClean="0"/>
-              <a:t>Background Negation &amp; Implicature</a:t>
-            </a:r>
+              <a:t>Prior Research</a:t>
+            </a:r>
+            <a:endParaRPr lang="en-US" dirty="0" smtClean="0"/>
           </a:p>
           <a:p>
             <a:r>
               <a:rPr lang="en-US" dirty="0" smtClean="0"/>
-              <a:t>Experimental Game Design</a:t>
+              <a:t>Experiment </a:t>
+            </a:r>
+            <a:r>
+              <a:rPr lang="en-US" dirty="0" smtClean="0"/>
+              <a:t>Game Design</a:t>
             </a:r>
           </a:p>
           <a:p>
@@ -7945,8 +8721,12 @@
               <a:t>Adults on </a:t>
             </a:r>
             <a:r>
-              <a:rPr lang="en-US" dirty="0" err="1" smtClean="0"/>
-              <a:t>mturk</a:t>
+              <a:rPr lang="en-US" dirty="0" smtClean="0"/>
+              <a:t>Mechanical Tu</a:t>
+            </a:r>
+            <a:r>
+              <a:rPr lang="en-US" dirty="0" smtClean="0"/>
+              <a:t>rk</a:t>
             </a:r>
             <a:endParaRPr lang="en-US" dirty="0" smtClean="0"/>
           </a:p>
@@ -7954,22 +8734,38 @@
             <a:pPr lvl="1"/>
             <a:r>
               <a:rPr lang="en-US" dirty="0" smtClean="0"/>
-              <a:t>Children at Bing Preschool</a:t>
-            </a:r>
-          </a:p>
-          <a:p>
+              <a:t>Children at Bing </a:t>
+            </a:r>
             <a:r>
               <a:rPr lang="en-US" dirty="0" smtClean="0"/>
-              <a:t>Compare </a:t>
-            </a:r>
+              <a:t>Nursery School</a:t>
+            </a:r>
+            <a:endParaRPr lang="en-US" dirty="0" smtClean="0"/>
+          </a:p>
+          <a:p>
             <a:r>
               <a:rPr lang="en-US" dirty="0" smtClean="0"/>
-              <a:t>Results </a:t>
+              <a:t>Comparing </a:t>
             </a:r>
             <a:r>
               <a:rPr lang="en-US" dirty="0" smtClean="0"/>
-              <a:t>to Prior Work</a:t>
-            </a:r>
+              <a:t>Results to Prior </a:t>
+            </a:r>
+            <a:r>
+              <a:rPr lang="en-US" dirty="0" smtClean="0"/>
+              <a:t>Research</a:t>
+            </a:r>
+          </a:p>
+          <a:p>
+            <a:r>
+              <a:rPr lang="en-US" dirty="0" smtClean="0"/>
+              <a:t>Future Directions </a:t>
+            </a:r>
+            <a:r>
+              <a:rPr lang="en-US" b="1" dirty="0" smtClean="0"/>
+              <a:t>MOOT SECTION???</a:t>
+            </a:r>
+            <a:endParaRPr lang="en-US" dirty="0" smtClean="0"/>
           </a:p>
         </p:txBody>
       </p:sp>
@@ -8012,6 +8808,98 @@
       </p:grpSpPr>
       <p:sp>
         <p:nvSpPr>
+          <p:cNvPr id="11" name="Rounded Rectangle 10"/>
+          <p:cNvSpPr/>
+          <p:nvPr/>
+        </p:nvSpPr>
+        <p:spPr>
+          <a:xfrm>
+            <a:off x="4648200" y="1371600"/>
+            <a:ext cx="4038600" cy="5105400"/>
+          </a:xfrm>
+          <a:prstGeom prst="roundRect">
+            <a:avLst/>
+          </a:prstGeom>
+          <a:solidFill>
+            <a:schemeClr val="accent2">
+              <a:lumMod val="40000"/>
+              <a:lumOff val="60000"/>
+            </a:schemeClr>
+          </a:solidFill>
+        </p:spPr>
+        <p:style>
+          <a:lnRef idx="2">
+            <a:schemeClr val="accent1">
+              <a:shade val="50000"/>
+            </a:schemeClr>
+          </a:lnRef>
+          <a:fillRef idx="1">
+            <a:schemeClr val="accent1"/>
+          </a:fillRef>
+          <a:effectRef idx="0">
+            <a:schemeClr val="accent1"/>
+          </a:effectRef>
+          <a:fontRef idx="minor">
+            <a:schemeClr val="lt1"/>
+          </a:fontRef>
+        </p:style>
+        <p:txBody>
+          <a:bodyPr rtlCol="0" anchor="ctr"/>
+          <a:lstStyle/>
+          <a:p>
+            <a:pPr algn="ctr"/>
+            <a:endParaRPr lang="en-US"/>
+          </a:p>
+        </p:txBody>
+      </p:sp>
+      <p:sp>
+        <p:nvSpPr>
+          <p:cNvPr id="9" name="Rounded Rectangle 8"/>
+          <p:cNvSpPr/>
+          <p:nvPr/>
+        </p:nvSpPr>
+        <p:spPr>
+          <a:xfrm>
+            <a:off x="457200" y="1371600"/>
+            <a:ext cx="4038600" cy="5105400"/>
+          </a:xfrm>
+          <a:prstGeom prst="roundRect">
+            <a:avLst/>
+          </a:prstGeom>
+          <a:solidFill>
+            <a:schemeClr val="accent4">
+              <a:lumMod val="40000"/>
+              <a:lumOff val="60000"/>
+            </a:schemeClr>
+          </a:solidFill>
+        </p:spPr>
+        <p:style>
+          <a:lnRef idx="2">
+            <a:schemeClr val="accent1">
+              <a:shade val="50000"/>
+            </a:schemeClr>
+          </a:lnRef>
+          <a:fillRef idx="1">
+            <a:schemeClr val="accent1"/>
+          </a:fillRef>
+          <a:effectRef idx="0">
+            <a:schemeClr val="accent1"/>
+          </a:effectRef>
+          <a:fontRef idx="minor">
+            <a:schemeClr val="lt1"/>
+          </a:fontRef>
+        </p:style>
+        <p:txBody>
+          <a:bodyPr rtlCol="0" anchor="ctr"/>
+          <a:lstStyle/>
+          <a:p>
+            <a:pPr algn="ctr"/>
+            <a:endParaRPr lang="en-US"/>
+          </a:p>
+        </p:txBody>
+      </p:sp>
+      <p:sp>
+        <p:nvSpPr>
           <p:cNvPr id="2" name="Title 1"/>
           <p:cNvSpPr>
             <a:spLocks noGrp="1"/>
@@ -8022,27 +8910,51 @@
         </p:nvSpPr>
         <p:spPr/>
         <p:txBody>
+          <a:bodyPr/>
+          <a:lstStyle/>
+          <a:p>
+            <a:r>
+              <a:rPr lang="en-US" dirty="0" smtClean="0"/>
+              <a:t>Prior Research</a:t>
+            </a:r>
+            <a:endParaRPr lang="en-US" dirty="0"/>
+          </a:p>
+        </p:txBody>
+      </p:sp>
+      <p:sp>
+        <p:nvSpPr>
+          <p:cNvPr id="4" name="Text Placeholder 3"/>
+          <p:cNvSpPr>
+            <a:spLocks noGrp="1"/>
+          </p:cNvSpPr>
+          <p:nvPr>
+            <p:ph type="body" idx="1"/>
+          </p:nvPr>
+        </p:nvSpPr>
+        <p:spPr/>
+        <p:txBody>
           <a:bodyPr>
             <a:normAutofit/>
           </a:bodyPr>
           <a:lstStyle/>
           <a:p>
-            <a:r>
-              <a:rPr lang="en-US" dirty="0" smtClean="0"/>
-              <a:t>Background</a:t>
-            </a:r>
-            <a:endParaRPr lang="en-US" dirty="0"/>
+            <a:pPr algn="ctr"/>
+            <a:r>
+              <a:rPr lang="en-US" sz="2800" u="sng" dirty="0" smtClean="0"/>
+              <a:t>Ad Hoc Implicature</a:t>
+            </a:r>
+            <a:endParaRPr lang="en-US" sz="2800" u="sng" dirty="0"/>
           </a:p>
         </p:txBody>
       </p:sp>
       <p:sp>
         <p:nvSpPr>
-          <p:cNvPr id="3" name="Content Placeholder 2"/>
+          <p:cNvPr id="5" name="Content Placeholder 4"/>
           <p:cNvSpPr>
             <a:spLocks noGrp="1"/>
           </p:cNvSpPr>
           <p:nvPr>
-            <p:ph idx="1"/>
+            <p:ph sz="half" idx="2"/>
           </p:nvPr>
         </p:nvSpPr>
         <p:spPr/>
@@ -8050,22 +8962,50 @@
           <a:bodyPr/>
           <a:lstStyle/>
           <a:p>
-            <a:r>
-              <a:rPr lang="en-US" dirty="0" smtClean="0"/>
+            <a:endParaRPr lang="en-US"/>
+          </a:p>
+        </p:txBody>
+      </p:sp>
+      <p:sp>
+        <p:nvSpPr>
+          <p:cNvPr id="6" name="Text Placeholder 5"/>
+          <p:cNvSpPr>
+            <a:spLocks noGrp="1"/>
+          </p:cNvSpPr>
+          <p:nvPr>
+            <p:ph type="body" sz="quarter" idx="3"/>
+          </p:nvPr>
+        </p:nvSpPr>
+        <p:spPr/>
+        <p:txBody>
+          <a:bodyPr>
+            <a:normAutofit/>
+          </a:bodyPr>
+          <a:lstStyle/>
+          <a:p>
+            <a:pPr algn="ctr"/>
+            <a:r>
+              <a:rPr lang="en-US" sz="2800" u="sng" dirty="0" smtClean="0"/>
               <a:t>Negation</a:t>
             </a:r>
-          </a:p>
-          <a:p>
-            <a:r>
-              <a:rPr lang="en-US" dirty="0" smtClean="0"/>
-              <a:t>Ad Hoc </a:t>
-            </a:r>
-            <a:r>
-              <a:rPr lang="en-US" dirty="0" err="1" smtClean="0"/>
-              <a:t>Implicatures</a:t>
-            </a:r>
-            <a:endParaRPr lang="en-US" dirty="0" smtClean="0"/>
-          </a:p>
+            <a:endParaRPr lang="en-US" sz="2800" u="sng" dirty="0"/>
+          </a:p>
+        </p:txBody>
+      </p:sp>
+      <p:sp>
+        <p:nvSpPr>
+          <p:cNvPr id="7" name="Content Placeholder 6"/>
+          <p:cNvSpPr>
+            <a:spLocks noGrp="1"/>
+          </p:cNvSpPr>
+          <p:nvPr>
+            <p:ph sz="quarter" idx="4"/>
+          </p:nvPr>
+        </p:nvSpPr>
+        <p:spPr/>
+        <p:txBody>
+          <a:bodyPr/>
+          <a:lstStyle/>
           <a:p>
             <a:endParaRPr lang="en-US" dirty="0"/>
           </a:p>
@@ -8074,13 +9014,20 @@
     </p:spTree>
     <p:extLst>
       <p:ext uri="{BB962C8B-B14F-4D97-AF65-F5344CB8AC3E}">
-        <p14:creationId xmlns:p14="http://schemas.microsoft.com/office/powerpoint/2010/main" val="1717518718"/>
+        <p14:creationId xmlns:p14="http://schemas.microsoft.com/office/powerpoint/2010/main" val="4110311647"/>
       </p:ext>
     </p:extLst>
   </p:cSld>
   <p:clrMapOvr>
     <a:masterClrMapping/>
   </p:clrMapOvr>
+  <p:timing>
+    <p:tnLst>
+      <p:par>
+        <p:cTn id="1" dur="indefinite" restart="never" nodeType="tmRoot"/>
+      </p:par>
+    </p:tnLst>
+  </p:timing>
 </p:sld>
 </file>
 
@@ -8248,6 +9195,78 @@
 </file>
 
 <file path=ppt/slides/slide5.xml><?xml version="1.0" encoding="utf-8"?>
+<p:sld xmlns:a="http://schemas.openxmlformats.org/drawingml/2006/main" xmlns:r="http://schemas.openxmlformats.org/officeDocument/2006/relationships" xmlns:p="http://schemas.openxmlformats.org/presentationml/2006/main">
+  <p:cSld>
+    <p:spTree>
+      <p:nvGrpSpPr>
+        <p:cNvPr id="1" name=""/>
+        <p:cNvGrpSpPr/>
+        <p:nvPr/>
+      </p:nvGrpSpPr>
+      <p:grpSpPr>
+        <a:xfrm>
+          <a:off x="0" y="0"/>
+          <a:ext cx="0" cy="0"/>
+          <a:chOff x="0" y="0"/>
+          <a:chExt cx="0" cy="0"/>
+        </a:xfrm>
+      </p:grpSpPr>
+      <p:pic>
+        <p:nvPicPr>
+          <p:cNvPr id="2" name="Picture 1"/>
+          <p:cNvPicPr>
+            <a:picLocks noChangeAspect="1"/>
+          </p:cNvPicPr>
+          <p:nvPr/>
+        </p:nvPicPr>
+        <p:blipFill rotWithShape="1">
+          <a:blip r:embed="rId2">
+            <a:extLst>
+              <a:ext uri="{28A0092B-C50C-407E-A947-70E740481C1C}">
+                <a14:useLocalDpi xmlns:a14="http://schemas.microsoft.com/office/drawing/2010/main" val="0"/>
+              </a:ext>
+            </a:extLst>
+          </a:blip>
+          <a:srcRect l="9827" t="18406" r="11551"/>
+          <a:stretch/>
+        </p:blipFill>
+        <p:spPr>
+          <a:xfrm>
+            <a:off x="194301" y="1143000"/>
+            <a:ext cx="8755398" cy="4437956"/>
+          </a:xfrm>
+          <a:prstGeom prst="rect">
+            <a:avLst/>
+          </a:prstGeom>
+          <a:ln>
+            <a:noFill/>
+          </a:ln>
+          <a:effectLst>
+            <a:softEdge rad="112500"/>
+          </a:effectLst>
+        </p:spPr>
+      </p:pic>
+    </p:spTree>
+    <p:extLst>
+      <p:ext uri="{BB962C8B-B14F-4D97-AF65-F5344CB8AC3E}">
+        <p14:creationId xmlns:p14="http://schemas.microsoft.com/office/powerpoint/2010/main" val="392783456"/>
+      </p:ext>
+    </p:extLst>
+  </p:cSld>
+  <p:clrMapOvr>
+    <a:masterClrMapping/>
+  </p:clrMapOvr>
+  <p:timing>
+    <p:tnLst>
+      <p:par>
+        <p:cTn id="1" dur="indefinite" restart="never" nodeType="tmRoot"/>
+      </p:par>
+    </p:tnLst>
+  </p:timing>
+</p:sld>
+</file>
+
+<file path=ppt/slides/slide6.xml><?xml version="1.0" encoding="utf-8"?>
 <p:sld xmlns:a="http://schemas.openxmlformats.org/drawingml/2006/main" xmlns:r="http://schemas.openxmlformats.org/officeDocument/2006/relationships" xmlns:p="http://schemas.openxmlformats.org/presentationml/2006/main">
   <p:cSld>
     <p:spTree>
@@ -8816,78 +9835,6 @@
 </p:sld>
 </file>
 
-<file path=ppt/slides/slide6.xml><?xml version="1.0" encoding="utf-8"?>
-<p:sld xmlns:a="http://schemas.openxmlformats.org/drawingml/2006/main" xmlns:r="http://schemas.openxmlformats.org/officeDocument/2006/relationships" xmlns:p="http://schemas.openxmlformats.org/presentationml/2006/main">
-  <p:cSld>
-    <p:spTree>
-      <p:nvGrpSpPr>
-        <p:cNvPr id="1" name=""/>
-        <p:cNvGrpSpPr/>
-        <p:nvPr/>
-      </p:nvGrpSpPr>
-      <p:grpSpPr>
-        <a:xfrm>
-          <a:off x="0" y="0"/>
-          <a:ext cx="0" cy="0"/>
-          <a:chOff x="0" y="0"/>
-          <a:chExt cx="0" cy="0"/>
-        </a:xfrm>
-      </p:grpSpPr>
-      <p:sp>
-        <p:nvSpPr>
-          <p:cNvPr id="2" name="Title 1"/>
-          <p:cNvSpPr>
-            <a:spLocks noGrp="1"/>
-          </p:cNvSpPr>
-          <p:nvPr>
-            <p:ph type="title"/>
-          </p:nvPr>
-        </p:nvSpPr>
-        <p:spPr/>
-        <p:txBody>
-          <a:bodyPr/>
-          <a:lstStyle/>
-          <a:p>
-            <a:r>
-              <a:rPr lang="en-US" dirty="0" smtClean="0"/>
-              <a:t>Kid’s Sample Video</a:t>
-            </a:r>
-            <a:endParaRPr lang="en-US" dirty="0"/>
-          </a:p>
-        </p:txBody>
-      </p:sp>
-      <p:sp>
-        <p:nvSpPr>
-          <p:cNvPr id="3" name="Content Placeholder 2"/>
-          <p:cNvSpPr>
-            <a:spLocks noGrp="1"/>
-          </p:cNvSpPr>
-          <p:nvPr>
-            <p:ph idx="1"/>
-          </p:nvPr>
-        </p:nvSpPr>
-        <p:spPr/>
-        <p:txBody>
-          <a:bodyPr/>
-          <a:lstStyle/>
-          <a:p>
-            <a:endParaRPr lang="en-US"/>
-          </a:p>
-        </p:txBody>
-      </p:sp>
-    </p:spTree>
-    <p:extLst>
-      <p:ext uri="{BB962C8B-B14F-4D97-AF65-F5344CB8AC3E}">
-        <p14:creationId xmlns:p14="http://schemas.microsoft.com/office/powerpoint/2010/main" val="1937707095"/>
-      </p:ext>
-    </p:extLst>
-  </p:cSld>
-  <p:clrMapOvr>
-    <a:masterClrMapping/>
-  </p:clrMapOvr>
-</p:sld>
-</file>
-
 <file path=ppt/slides/slide7.xml><?xml version="1.0" encoding="utf-8"?>
 <p:sld xmlns:a="http://schemas.openxmlformats.org/drawingml/2006/main" xmlns:r="http://schemas.openxmlformats.org/officeDocument/2006/relationships" xmlns:p="http://schemas.openxmlformats.org/presentationml/2006/main">
   <p:cSld>
@@ -8905,52 +9852,38 @@
           <a:chExt cx="0" cy="0"/>
         </a:xfrm>
       </p:grpSpPr>
-      <p:sp>
-        <p:nvSpPr>
-          <p:cNvPr id="2" name="Title 1"/>
-          <p:cNvSpPr>
-            <a:spLocks noGrp="1"/>
-          </p:cNvSpPr>
+      <p:pic>
+        <p:nvPicPr>
+          <p:cNvPr id="4" name="Content Placeholder 3"/>
+          <p:cNvPicPr>
+            <a:picLocks noGrp="1" noChangeAspect="1"/>
+          </p:cNvPicPr>
           <p:nvPr>
-            <p:ph type="title"/>
+            <p:ph idx="4294967295"/>
           </p:nvPr>
-        </p:nvSpPr>
-        <p:spPr/>
-        <p:txBody>
-          <a:bodyPr/>
-          <a:lstStyle/>
-          <a:p>
-            <a:r>
-              <a:rPr lang="en-US" dirty="0" smtClean="0"/>
-              <a:t>Adult’s Results</a:t>
-            </a:r>
-            <a:endParaRPr lang="en-US" dirty="0"/>
-          </a:p>
-        </p:txBody>
-      </p:sp>
-      <p:sp>
-        <p:nvSpPr>
-          <p:cNvPr id="3" name="Content Placeholder 2"/>
-          <p:cNvSpPr>
-            <a:spLocks noGrp="1"/>
-          </p:cNvSpPr>
-          <p:nvPr>
-            <p:ph idx="1"/>
-          </p:nvPr>
-        </p:nvSpPr>
-        <p:spPr/>
-        <p:txBody>
-          <a:bodyPr/>
-          <a:lstStyle/>
-          <a:p>
-            <a:endParaRPr lang="en-US"/>
-          </a:p>
-        </p:txBody>
-      </p:sp>
+        </p:nvPicPr>
+        <p:blipFill rotWithShape="1">
+          <a:blip r:embed="rId2">
+            <a:extLst>
+              <a:ext uri="{28A0092B-C50C-407E-A947-70E740481C1C}">
+                <a14:useLocalDpi xmlns:a14="http://schemas.microsoft.com/office/drawing/2010/main" val="0"/>
+              </a:ext>
+            </a:extLst>
+          </a:blip>
+          <a:srcRect l="18798" r="19002" b="3579"/>
+          <a:stretch/>
+        </p:blipFill>
+        <p:spPr>
+          <a:xfrm>
+            <a:off x="1181100" y="357482"/>
+            <a:ext cx="6781800" cy="6195718"/>
+          </a:xfrm>
+        </p:spPr>
+      </p:pic>
     </p:spTree>
     <p:extLst>
       <p:ext uri="{BB962C8B-B14F-4D97-AF65-F5344CB8AC3E}">
-        <p14:creationId xmlns:p14="http://schemas.microsoft.com/office/powerpoint/2010/main" val="122498930"/>
+        <p14:creationId xmlns:p14="http://schemas.microsoft.com/office/powerpoint/2010/main" val="2002289379"/>
       </p:ext>
     </p:extLst>
   </p:cSld>
@@ -8996,14 +9929,12 @@
         </p:nvSpPr>
         <p:spPr/>
         <p:txBody>
-          <a:bodyPr>
-            <a:normAutofit/>
-          </a:bodyPr>
+          <a:bodyPr/>
           <a:lstStyle/>
           <a:p>
             <a:r>
               <a:rPr lang="en-US" dirty="0" smtClean="0"/>
-              <a:t>Children’s Results</a:t>
+              <a:t>Adult’s Results</a:t>
             </a:r>
             <a:endParaRPr lang="en-US" dirty="0"/>
           </a:p>
@@ -9024,6 +9955,36 @@
           <a:bodyPr/>
           <a:lstStyle/>
           <a:p>
+            <a:r>
+              <a:rPr lang="en-US" dirty="0" smtClean="0"/>
+              <a:t>“General RT &amp; Accuracy Data”</a:t>
+            </a:r>
+          </a:p>
+          <a:p>
+            <a:r>
+              <a:rPr lang="en-US" dirty="0" smtClean="0"/>
+              <a:t>Correlation of </a:t>
+            </a:r>
+            <a:r>
+              <a:rPr lang="en-US" dirty="0" err="1" smtClean="0"/>
+              <a:t>Inhib</a:t>
+            </a:r>
+            <a:r>
+              <a:rPr lang="en-US" dirty="0" smtClean="0"/>
+              <a:t> to 1) </a:t>
+            </a:r>
+            <a:r>
+              <a:rPr lang="en-US" dirty="0" err="1" smtClean="0"/>
+              <a:t>Neg</a:t>
+            </a:r>
+            <a:r>
+              <a:rPr lang="en-US" dirty="0" smtClean="0"/>
+              <a:t> &amp; 2) </a:t>
+            </a:r>
+            <a:r>
+              <a:rPr lang="en-US" dirty="0" err="1" smtClean="0"/>
+              <a:t>Implic</a:t>
+            </a:r>
             <a:endParaRPr lang="en-US" dirty="0"/>
           </a:p>
         </p:txBody>
@@ -9031,7 +9992,7 @@
     </p:spTree>
     <p:extLst>
       <p:ext uri="{BB962C8B-B14F-4D97-AF65-F5344CB8AC3E}">
-        <p14:creationId xmlns:p14="http://schemas.microsoft.com/office/powerpoint/2010/main" val="947664464"/>
+        <p14:creationId xmlns:p14="http://schemas.microsoft.com/office/powerpoint/2010/main" val="122498930"/>
       </p:ext>
     </p:extLst>
   </p:cSld>
@@ -9082,7 +10043,7 @@
           <a:p>
             <a:r>
               <a:rPr lang="en-US" dirty="0" smtClean="0"/>
-              <a:t>Compare to Prior Work</a:t>
+              <a:t>Kid’s Sample Video</a:t>
             </a:r>
             <a:endParaRPr lang="en-US" dirty="0"/>
           </a:p>
@@ -9103,20 +10064,31 @@
           <a:bodyPr/>
           <a:lstStyle/>
           <a:p>
-            <a:endParaRPr lang="en-US"/>
+            <a:r>
+              <a:rPr lang="en-US" dirty="0" smtClean="0"/>
+              <a:t>FIND VIDEO THAT SHOWS KID PLAYING GAME</a:t>
+            </a:r>
+            <a:endParaRPr lang="en-US" dirty="0"/>
           </a:p>
         </p:txBody>
       </p:sp>
     </p:spTree>
     <p:extLst>
       <p:ext uri="{BB962C8B-B14F-4D97-AF65-F5344CB8AC3E}">
-        <p14:creationId xmlns:p14="http://schemas.microsoft.com/office/powerpoint/2010/main" val="2989530057"/>
+        <p14:creationId xmlns:p14="http://schemas.microsoft.com/office/powerpoint/2010/main" val="1937707095"/>
       </p:ext>
     </p:extLst>
   </p:cSld>
   <p:clrMapOvr>
     <a:masterClrMapping/>
   </p:clrMapOvr>
+  <p:timing>
+    <p:tnLst>
+      <p:par>
+        <p:cTn id="1" dur="indefinite" restart="never" nodeType="tmRoot"/>
+      </p:par>
+    </p:tnLst>
+  </p:timing>
 </p:sld>
 </file>
 

</xml_diff>

<commit_message>
PowerPoint... all but the data/video
</commit_message>
<xml_diff>
--- a/Stephen_Final_Presentation/CSLI Final Presentation Stephen Powell.pptx
+++ b/Stephen_Final_Presentation/CSLI Final Presentation Stephen Powell.pptx
@@ -6,18 +6,22 @@
   </p:sldMasterIdLst>
   <p:sldIdLst>
     <p:sldId id="256" r:id="rId2"/>
-    <p:sldId id="263" r:id="rId3"/>
-    <p:sldId id="273" r:id="rId4"/>
-    <p:sldId id="260" r:id="rId5"/>
-    <p:sldId id="272" r:id="rId6"/>
+    <p:sldId id="277" r:id="rId3"/>
+    <p:sldId id="275" r:id="rId4"/>
+    <p:sldId id="276" r:id="rId5"/>
+    <p:sldId id="278" r:id="rId6"/>
     <p:sldId id="262" r:id="rId7"/>
-    <p:sldId id="271" r:id="rId8"/>
-    <p:sldId id="264" r:id="rId9"/>
-    <p:sldId id="266" r:id="rId10"/>
+    <p:sldId id="272" r:id="rId8"/>
+    <p:sldId id="266" r:id="rId9"/>
+    <p:sldId id="264" r:id="rId10"/>
     <p:sldId id="265" r:id="rId11"/>
-    <p:sldId id="268" r:id="rId12"/>
-    <p:sldId id="269" r:id="rId13"/>
-    <p:sldId id="270" r:id="rId14"/>
+    <p:sldId id="274" r:id="rId12"/>
+    <p:sldId id="268" r:id="rId13"/>
+    <p:sldId id="269" r:id="rId14"/>
+    <p:sldId id="270" r:id="rId15"/>
+    <p:sldId id="263" r:id="rId16"/>
+    <p:sldId id="260" r:id="rId17"/>
+    <p:sldId id="271" r:id="rId18"/>
   </p:sldIdLst>
   <p:sldSz cx="9144000" cy="6858000" type="screen4x3"/>
   <p:notesSz cx="6858000" cy="9144000"/>
@@ -4735,7 +4739,7 @@
           <a:p>
             <a:fld id="{361D2084-9100-45CA-96A5-41C7BC657BCD}" type="datetimeFigureOut">
               <a:rPr lang="en-US" smtClean="0"/>
-              <a:t>8/10/2015</a:t>
+              <a:t>8/11/2015</a:t>
             </a:fld>
             <a:endParaRPr lang="en-US"/>
           </a:p>
@@ -4905,7 +4909,7 @@
           <a:p>
             <a:fld id="{361D2084-9100-45CA-96A5-41C7BC657BCD}" type="datetimeFigureOut">
               <a:rPr lang="en-US" smtClean="0"/>
-              <a:t>8/10/2015</a:t>
+              <a:t>8/11/2015</a:t>
             </a:fld>
             <a:endParaRPr lang="en-US"/>
           </a:p>
@@ -5085,7 +5089,7 @@
           <a:p>
             <a:fld id="{361D2084-9100-45CA-96A5-41C7BC657BCD}" type="datetimeFigureOut">
               <a:rPr lang="en-US" smtClean="0"/>
-              <a:t>8/10/2015</a:t>
+              <a:t>8/11/2015</a:t>
             </a:fld>
             <a:endParaRPr lang="en-US"/>
           </a:p>
@@ -5255,7 +5259,7 @@
           <a:p>
             <a:fld id="{361D2084-9100-45CA-96A5-41C7BC657BCD}" type="datetimeFigureOut">
               <a:rPr lang="en-US" smtClean="0"/>
-              <a:t>8/10/2015</a:t>
+              <a:t>8/11/2015</a:t>
             </a:fld>
             <a:endParaRPr lang="en-US"/>
           </a:p>
@@ -5501,7 +5505,7 @@
           <a:p>
             <a:fld id="{361D2084-9100-45CA-96A5-41C7BC657BCD}" type="datetimeFigureOut">
               <a:rPr lang="en-US" smtClean="0"/>
-              <a:t>8/10/2015</a:t>
+              <a:t>8/11/2015</a:t>
             </a:fld>
             <a:endParaRPr lang="en-US"/>
           </a:p>
@@ -5789,7 +5793,7 @@
           <a:p>
             <a:fld id="{361D2084-9100-45CA-96A5-41C7BC657BCD}" type="datetimeFigureOut">
               <a:rPr lang="en-US" smtClean="0"/>
-              <a:t>8/10/2015</a:t>
+              <a:t>8/11/2015</a:t>
             </a:fld>
             <a:endParaRPr lang="en-US"/>
           </a:p>
@@ -6211,7 +6215,7 @@
           <a:p>
             <a:fld id="{361D2084-9100-45CA-96A5-41C7BC657BCD}" type="datetimeFigureOut">
               <a:rPr lang="en-US" smtClean="0"/>
-              <a:t>8/10/2015</a:t>
+              <a:t>8/11/2015</a:t>
             </a:fld>
             <a:endParaRPr lang="en-US"/>
           </a:p>
@@ -6329,7 +6333,7 @@
           <a:p>
             <a:fld id="{361D2084-9100-45CA-96A5-41C7BC657BCD}" type="datetimeFigureOut">
               <a:rPr lang="en-US" smtClean="0"/>
-              <a:t>8/10/2015</a:t>
+              <a:t>8/11/2015</a:t>
             </a:fld>
             <a:endParaRPr lang="en-US"/>
           </a:p>
@@ -6424,7 +6428,7 @@
           <a:p>
             <a:fld id="{361D2084-9100-45CA-96A5-41C7BC657BCD}" type="datetimeFigureOut">
               <a:rPr lang="en-US" smtClean="0"/>
-              <a:t>8/10/2015</a:t>
+              <a:t>8/11/2015</a:t>
             </a:fld>
             <a:endParaRPr lang="en-US"/>
           </a:p>
@@ -6701,7 +6705,7 @@
           <a:p>
             <a:fld id="{361D2084-9100-45CA-96A5-41C7BC657BCD}" type="datetimeFigureOut">
               <a:rPr lang="en-US" smtClean="0"/>
-              <a:t>8/10/2015</a:t>
+              <a:t>8/11/2015</a:t>
             </a:fld>
             <a:endParaRPr lang="en-US"/>
           </a:p>
@@ -6954,7 +6958,7 @@
           <a:p>
             <a:fld id="{361D2084-9100-45CA-96A5-41C7BC657BCD}" type="datetimeFigureOut">
               <a:rPr lang="en-US" smtClean="0"/>
-              <a:t>8/10/2015</a:t>
+              <a:t>8/11/2015</a:t>
             </a:fld>
             <a:endParaRPr lang="en-US"/>
           </a:p>
@@ -7191,7 +7195,7 @@
           <a:p>
             <a:fld id="{361D2084-9100-45CA-96A5-41C7BC657BCD}" type="datetimeFigureOut">
               <a:rPr lang="en-US" smtClean="0"/>
-              <a:t>8/10/2015</a:t>
+              <a:t>8/11/2015</a:t>
             </a:fld>
             <a:endParaRPr lang="en-US"/>
           </a:p>
@@ -7657,19 +7661,7 @@
           <a:p>
             <a:r>
               <a:rPr lang="en-US" b="1" dirty="0" smtClean="0"/>
-              <a:t>Inhibitory Control </a:t>
-            </a:r>
-            <a:r>
-              <a:rPr lang="en-US" b="1" dirty="0" smtClean="0"/>
-              <a:t>in </a:t>
-            </a:r>
-            <a:r>
-              <a:rPr lang="en-US" b="1" dirty="0" smtClean="0"/>
-              <a:t>Language </a:t>
-            </a:r>
-            <a:r>
-              <a:rPr lang="en-US" b="1" dirty="0" smtClean="0"/>
-              <a:t>Games</a:t>
+              <a:t>Inhibitory Control in Language Games</a:t>
             </a:r>
             <a:endParaRPr lang="en-US" b="1" dirty="0"/>
           </a:p>
@@ -7821,7 +7813,7 @@
           <a:p>
             <a:r>
               <a:rPr lang="en-US" dirty="0" smtClean="0"/>
-              <a:t>Children’s Results</a:t>
+              <a:t>Reaction Time</a:t>
             </a:r>
             <a:endParaRPr lang="en-US" dirty="0"/>
           </a:p>
@@ -7843,34 +7835,16 @@
           <a:lstStyle/>
           <a:p>
             <a:r>
+              <a:rPr lang="en-US" dirty="0" smtClean="0"/>
+              <a:t>General </a:t>
+            </a:r>
+            <a:r>
               <a:rPr lang="en-US" dirty="0"/>
-              <a:t>“General RT &amp; Accuracy Data”</a:t>
-            </a:r>
-          </a:p>
-          <a:p>
-            <a:r>
-              <a:rPr lang="en-US" dirty="0"/>
-              <a:t>Correlation of </a:t>
-            </a:r>
-            <a:r>
-              <a:rPr lang="en-US" dirty="0" err="1"/>
-              <a:t>Inhib</a:t>
-            </a:r>
-            <a:r>
-              <a:rPr lang="en-US" dirty="0"/>
-              <a:t> to 1) </a:t>
-            </a:r>
-            <a:r>
-              <a:rPr lang="en-US" dirty="0" err="1"/>
-              <a:t>Neg</a:t>
-            </a:r>
-            <a:r>
-              <a:rPr lang="en-US" dirty="0"/>
-              <a:t> &amp; 2) </a:t>
-            </a:r>
-            <a:r>
-              <a:rPr lang="en-US" dirty="0" err="1"/>
-              <a:t>Implic</a:t>
+              <a:t>RT </a:t>
+            </a:r>
+            <a:r>
+              <a:rPr lang="en-US" dirty="0" smtClean="0"/>
+              <a:t>Data</a:t>
             </a:r>
             <a:endParaRPr lang="en-US" dirty="0"/>
           </a:p>
@@ -7900,6 +7874,80 @@
 </file>
 
 <file path=ppt/slides/slide11.xml><?xml version="1.0" encoding="utf-8"?>
+<p:sld xmlns:a="http://schemas.openxmlformats.org/drawingml/2006/main" xmlns:r="http://schemas.openxmlformats.org/officeDocument/2006/relationships" xmlns:p="http://schemas.openxmlformats.org/presentationml/2006/main">
+  <p:cSld>
+    <p:spTree>
+      <p:nvGrpSpPr>
+        <p:cNvPr id="1" name=""/>
+        <p:cNvGrpSpPr/>
+        <p:nvPr/>
+      </p:nvGrpSpPr>
+      <p:grpSpPr>
+        <a:xfrm>
+          <a:off x="0" y="0"/>
+          <a:ext cx="0" cy="0"/>
+          <a:chOff x="0" y="0"/>
+          <a:chExt cx="0" cy="0"/>
+        </a:xfrm>
+      </p:grpSpPr>
+      <p:sp>
+        <p:nvSpPr>
+          <p:cNvPr id="2" name="Title 1"/>
+          <p:cNvSpPr>
+            <a:spLocks noGrp="1"/>
+          </p:cNvSpPr>
+          <p:nvPr>
+            <p:ph type="title"/>
+          </p:nvPr>
+        </p:nvSpPr>
+        <p:spPr/>
+        <p:txBody>
+          <a:bodyPr>
+            <a:normAutofit/>
+          </a:bodyPr>
+          <a:lstStyle/>
+          <a:p>
+            <a:r>
+              <a:rPr lang="en-US" dirty="0" smtClean="0"/>
+              <a:t>Correlation</a:t>
+            </a:r>
+            <a:endParaRPr lang="en-US" dirty="0"/>
+          </a:p>
+        </p:txBody>
+      </p:sp>
+      <p:sp>
+        <p:nvSpPr>
+          <p:cNvPr id="3" name="Content Placeholder 2"/>
+          <p:cNvSpPr>
+            <a:spLocks noGrp="1"/>
+          </p:cNvSpPr>
+          <p:nvPr>
+            <p:ph idx="1"/>
+          </p:nvPr>
+        </p:nvSpPr>
+        <p:spPr/>
+        <p:txBody>
+          <a:bodyPr/>
+          <a:lstStyle/>
+          <a:p>
+            <a:endParaRPr lang="en-US"/>
+          </a:p>
+        </p:txBody>
+      </p:sp>
+    </p:spTree>
+    <p:extLst>
+      <p:ext uri="{BB962C8B-B14F-4D97-AF65-F5344CB8AC3E}">
+        <p14:creationId xmlns:p14="http://schemas.microsoft.com/office/powerpoint/2010/main" val="2981029283"/>
+      </p:ext>
+    </p:extLst>
+  </p:cSld>
+  <p:clrMapOvr>
+    <a:masterClrMapping/>
+  </p:clrMapOvr>
+</p:sld>
+</file>
+
+<file path=ppt/slides/slide12.xml><?xml version="1.0" encoding="utf-8"?>
 <p:sld xmlns:a="http://schemas.openxmlformats.org/drawingml/2006/main" xmlns:r="http://schemas.openxmlformats.org/officeDocument/2006/relationships" xmlns:p="http://schemas.openxmlformats.org/presentationml/2006/main">
   <p:cSld>
     <p:spTree>
@@ -8072,7 +8120,7 @@
           <a:bodyPr/>
           <a:lstStyle/>
           <a:p>
-            <a:endParaRPr lang="en-US"/>
+            <a:endParaRPr lang="en-US" dirty="0"/>
           </a:p>
         </p:txBody>
       </p:sp>
@@ -8125,114 +8173,6 @@
     <p:extLst>
       <p:ext uri="{BB962C8B-B14F-4D97-AF65-F5344CB8AC3E}">
         <p14:creationId xmlns:p14="http://schemas.microsoft.com/office/powerpoint/2010/main" val="2989530057"/>
-      </p:ext>
-    </p:extLst>
-  </p:cSld>
-  <p:clrMapOvr>
-    <a:masterClrMapping/>
-  </p:clrMapOvr>
-  <p:timing>
-    <p:tnLst>
-      <p:par>
-        <p:cTn id="1" dur="indefinite" restart="never" nodeType="tmRoot"/>
-      </p:par>
-    </p:tnLst>
-  </p:timing>
-</p:sld>
-</file>
-
-<file path=ppt/slides/slide12.xml><?xml version="1.0" encoding="utf-8"?>
-<p:sld xmlns:a="http://schemas.openxmlformats.org/drawingml/2006/main" xmlns:r="http://schemas.openxmlformats.org/officeDocument/2006/relationships" xmlns:p="http://schemas.openxmlformats.org/presentationml/2006/main">
-  <p:cSld>
-    <p:spTree>
-      <p:nvGrpSpPr>
-        <p:cNvPr id="1" name=""/>
-        <p:cNvGrpSpPr/>
-        <p:nvPr/>
-      </p:nvGrpSpPr>
-      <p:grpSpPr>
-        <a:xfrm>
-          <a:off x="0" y="0"/>
-          <a:ext cx="0" cy="0"/>
-          <a:chOff x="0" y="0"/>
-          <a:chExt cx="0" cy="0"/>
-        </a:xfrm>
-      </p:grpSpPr>
-      <p:sp>
-        <p:nvSpPr>
-          <p:cNvPr id="2" name="Title 1"/>
-          <p:cNvSpPr>
-            <a:spLocks noGrp="1"/>
-          </p:cNvSpPr>
-          <p:nvPr>
-            <p:ph type="title"/>
-          </p:nvPr>
-        </p:nvSpPr>
-        <p:spPr/>
-        <p:txBody>
-          <a:bodyPr>
-            <a:normAutofit/>
-          </a:bodyPr>
-          <a:lstStyle/>
-          <a:p>
-            <a:r>
-              <a:rPr lang="en-US" dirty="0" smtClean="0"/>
-              <a:t>Future Directions</a:t>
-            </a:r>
-            <a:endParaRPr lang="en-US" dirty="0"/>
-          </a:p>
-        </p:txBody>
-      </p:sp>
-      <p:sp>
-        <p:nvSpPr>
-          <p:cNvPr id="3" name="Content Placeholder 2"/>
-          <p:cNvSpPr>
-            <a:spLocks noGrp="1"/>
-          </p:cNvSpPr>
-          <p:nvPr>
-            <p:ph idx="1"/>
-          </p:nvPr>
-        </p:nvSpPr>
-        <p:spPr/>
-        <p:txBody>
-          <a:bodyPr/>
-          <a:lstStyle/>
-          <a:p>
-            <a:r>
-              <a:rPr lang="en-US" dirty="0" smtClean="0"/>
-              <a:t>Game was redesigned</a:t>
-            </a:r>
-          </a:p>
-          <a:p>
-            <a:r>
-              <a:rPr lang="en-US" dirty="0" smtClean="0"/>
-              <a:t>Currently on Mechanical Turk</a:t>
-            </a:r>
-          </a:p>
-          <a:p>
-            <a:r>
-              <a:rPr lang="en-US" dirty="0" smtClean="0"/>
-              <a:t>Reintroduce redesigned game to Bing</a:t>
-            </a:r>
-          </a:p>
-          <a:p>
-            <a:endParaRPr lang="en-US" dirty="0"/>
-          </a:p>
-          <a:p>
-            <a:r>
-              <a:rPr lang="en-US" b="1" dirty="0" smtClean="0"/>
-              <a:t>PERHAPS THIS SECTION IS MOOT WITH THE NEWEST RESULTS??? Ask Ann… </a:t>
-            </a:r>
-          </a:p>
-          <a:p>
-            <a:endParaRPr lang="en-US" dirty="0"/>
-          </a:p>
-        </p:txBody>
-      </p:sp>
-    </p:spTree>
-    <p:extLst>
-      <p:ext uri="{BB962C8B-B14F-4D97-AF65-F5344CB8AC3E}">
-        <p14:creationId xmlns:p14="http://schemas.microsoft.com/office/powerpoint/2010/main" val="3572580115"/>
       </p:ext>
     </p:extLst>
   </p:cSld>
@@ -8278,24 +8218,93 @@
         </p:nvSpPr>
         <p:spPr/>
         <p:txBody>
+          <a:bodyPr>
+            <a:normAutofit/>
+          </a:bodyPr>
+          <a:lstStyle/>
+          <a:p>
+            <a:r>
+              <a:rPr lang="en-US" dirty="0" smtClean="0"/>
+              <a:t>Conclusions</a:t>
+            </a:r>
+            <a:endParaRPr lang="en-US" dirty="0"/>
+          </a:p>
+        </p:txBody>
+      </p:sp>
+      <p:sp>
+        <p:nvSpPr>
+          <p:cNvPr id="3" name="Content Placeholder 2"/>
+          <p:cNvSpPr>
+            <a:spLocks noGrp="1"/>
+          </p:cNvSpPr>
+          <p:nvPr>
+            <p:ph idx="1"/>
+          </p:nvPr>
+        </p:nvSpPr>
+        <p:spPr/>
+        <p:txBody>
           <a:bodyPr/>
           <a:lstStyle/>
           <a:p>
+            <a:endParaRPr lang="en-US" dirty="0" smtClean="0"/>
+          </a:p>
+        </p:txBody>
+      </p:sp>
+    </p:spTree>
+    <p:extLst>
+      <p:ext uri="{BB962C8B-B14F-4D97-AF65-F5344CB8AC3E}">
+        <p14:creationId xmlns:p14="http://schemas.microsoft.com/office/powerpoint/2010/main" val="3572580115"/>
+      </p:ext>
+    </p:extLst>
+  </p:cSld>
+  <p:clrMapOvr>
+    <a:masterClrMapping/>
+  </p:clrMapOvr>
+  <p:timing>
+    <p:tnLst>
+      <p:par>
+        <p:cTn id="1" dur="indefinite" restart="never" nodeType="tmRoot"/>
+      </p:par>
+    </p:tnLst>
+  </p:timing>
+</p:sld>
+</file>
+
+<file path=ppt/slides/slide14.xml><?xml version="1.0" encoding="utf-8"?>
+<p:sld xmlns:a="http://schemas.openxmlformats.org/drawingml/2006/main" xmlns:r="http://schemas.openxmlformats.org/officeDocument/2006/relationships" xmlns:p="http://schemas.openxmlformats.org/presentationml/2006/main">
+  <p:cSld>
+    <p:spTree>
+      <p:nvGrpSpPr>
+        <p:cNvPr id="1" name=""/>
+        <p:cNvGrpSpPr/>
+        <p:nvPr/>
+      </p:nvGrpSpPr>
+      <p:grpSpPr>
+        <a:xfrm>
+          <a:off x="0" y="0"/>
+          <a:ext cx="0" cy="0"/>
+          <a:chOff x="0" y="0"/>
+          <a:chExt cx="0" cy="0"/>
+        </a:xfrm>
+      </p:grpSpPr>
+      <p:sp>
+        <p:nvSpPr>
+          <p:cNvPr id="2" name="Title 1"/>
+          <p:cNvSpPr>
+            <a:spLocks noGrp="1"/>
+          </p:cNvSpPr>
+          <p:nvPr>
+            <p:ph type="title"/>
+          </p:nvPr>
+        </p:nvSpPr>
+        <p:spPr/>
+        <p:txBody>
+          <a:bodyPr/>
+          <a:lstStyle/>
+          <a:p>
             <a:r>
               <a:rPr lang="en-US" dirty="0" smtClean="0"/>
-              <a:t>A Specia</a:t>
-            </a:r>
-            <a:r>
-              <a:rPr lang="en-US" dirty="0" smtClean="0"/>
-              <a:t>l </a:t>
-            </a:r>
-            <a:r>
-              <a:rPr lang="en-US" dirty="0" smtClean="0"/>
-              <a:t>Thanks </a:t>
-            </a:r>
-            <a:r>
-              <a:rPr lang="en-US" dirty="0" smtClean="0"/>
-              <a:t>To…</a:t>
+              <a:t>A Special Thanks To…</a:t>
             </a:r>
             <a:endParaRPr lang="en-US" dirty="0"/>
           </a:p>
@@ -8635,8 +8644,8 @@
 </p:sld>
 </file>
 
-<file path=ppt/slides/slide2.xml><?xml version="1.0" encoding="utf-8"?>
-<p:sld xmlns:a="http://schemas.openxmlformats.org/drawingml/2006/main" xmlns:r="http://schemas.openxmlformats.org/officeDocument/2006/relationships" xmlns:p="http://schemas.openxmlformats.org/presentationml/2006/main">
+<file path=ppt/slides/slide15.xml><?xml version="1.0" encoding="utf-8"?>
+<p:sld xmlns:a="http://schemas.openxmlformats.org/drawingml/2006/main" xmlns:r="http://schemas.openxmlformats.org/officeDocument/2006/relationships" xmlns:p="http://schemas.openxmlformats.org/presentationml/2006/main" show="0">
   <p:cSld>
     <p:spTree>
       <p:nvGrpSpPr>
@@ -8696,16 +8705,11 @@
               <a:rPr lang="en-US" dirty="0" smtClean="0"/>
               <a:t>Prior Research</a:t>
             </a:r>
-            <a:endParaRPr lang="en-US" dirty="0" smtClean="0"/>
           </a:p>
           <a:p>
             <a:r>
               <a:rPr lang="en-US" dirty="0" smtClean="0"/>
-              <a:t>Experiment </a:t>
-            </a:r>
-            <a:r>
-              <a:rPr lang="en-US" dirty="0" smtClean="0"/>
-              <a:t>Game Design</a:t>
+              <a:t>Experiment Game Design</a:t>
             </a:r>
           </a:p>
           <a:p>
@@ -8718,52 +8722,24 @@
             <a:pPr lvl="1"/>
             <a:r>
               <a:rPr lang="en-US" dirty="0" smtClean="0"/>
-              <a:t>Adults on </a:t>
-            </a:r>
+              <a:t>Adults on Mechanical Turk</a:t>
+            </a:r>
+          </a:p>
+          <a:p>
+            <a:pPr lvl="1"/>
             <a:r>
               <a:rPr lang="en-US" dirty="0" smtClean="0"/>
-              <a:t>Mechanical Tu</a:t>
-            </a:r>
+              <a:t>Children at Bing Nursery School</a:t>
+            </a:r>
+          </a:p>
+          <a:p>
             <a:r>
               <a:rPr lang="en-US" dirty="0" smtClean="0"/>
-              <a:t>rk</a:t>
-            </a:r>
-            <a:endParaRPr lang="en-US" dirty="0" smtClean="0"/>
-          </a:p>
-          <a:p>
-            <a:pPr lvl="1"/>
-            <a:r>
-              <a:rPr lang="en-US" dirty="0" smtClean="0"/>
-              <a:t>Children at Bing </a:t>
-            </a:r>
-            <a:r>
-              <a:rPr lang="en-US" dirty="0" smtClean="0"/>
-              <a:t>Nursery School</a:t>
-            </a:r>
-            <a:endParaRPr lang="en-US" dirty="0" smtClean="0"/>
-          </a:p>
-          <a:p>
-            <a:r>
-              <a:rPr lang="en-US" dirty="0" smtClean="0"/>
-              <a:t>Comparing </a:t>
-            </a:r>
-            <a:r>
-              <a:rPr lang="en-US" dirty="0" smtClean="0"/>
-              <a:t>Results to Prior </a:t>
+              <a:t>Comparing Results to Prior </a:t>
             </a:r>
             <a:r>
               <a:rPr lang="en-US" dirty="0" smtClean="0"/>
               <a:t>Research</a:t>
-            </a:r>
-          </a:p>
-          <a:p>
-            <a:r>
-              <a:rPr lang="en-US" dirty="0" smtClean="0"/>
-              <a:t>Future Directions </a:t>
-            </a:r>
-            <a:r>
-              <a:rPr lang="en-US" b="1" dirty="0" smtClean="0"/>
-              <a:t>MOOT SECTION???</a:t>
             </a:r>
             <a:endParaRPr lang="en-US" dirty="0" smtClean="0"/>
           </a:p>
@@ -8779,6 +8755,14 @@
   <p:clrMapOvr>
     <a:masterClrMapping/>
   </p:clrMapOvr>
+  <mc:AlternateContent xmlns:mc="http://schemas.openxmlformats.org/markup-compatibility/2006">
+    <mc:Choice xmlns:p14="http://schemas.microsoft.com/office/powerpoint/2010/main" Requires="p14">
+      <p:transition spd="slow" p14:dur="2000"/>
+    </mc:Choice>
+    <mc:Fallback>
+      <p:transition spd="slow"/>
+    </mc:Fallback>
+  </mc:AlternateContent>
   <p:timing>
     <p:tnLst>
       <p:par>
@@ -8789,250 +8773,8 @@
 </p:sld>
 </file>
 
-<file path=ppt/slides/slide3.xml><?xml version="1.0" encoding="utf-8"?>
-<p:sld xmlns:a="http://schemas.openxmlformats.org/drawingml/2006/main" xmlns:r="http://schemas.openxmlformats.org/officeDocument/2006/relationships" xmlns:p="http://schemas.openxmlformats.org/presentationml/2006/main">
-  <p:cSld>
-    <p:spTree>
-      <p:nvGrpSpPr>
-        <p:cNvPr id="1" name=""/>
-        <p:cNvGrpSpPr/>
-        <p:nvPr/>
-      </p:nvGrpSpPr>
-      <p:grpSpPr>
-        <a:xfrm>
-          <a:off x="0" y="0"/>
-          <a:ext cx="0" cy="0"/>
-          <a:chOff x="0" y="0"/>
-          <a:chExt cx="0" cy="0"/>
-        </a:xfrm>
-      </p:grpSpPr>
-      <p:sp>
-        <p:nvSpPr>
-          <p:cNvPr id="11" name="Rounded Rectangle 10"/>
-          <p:cNvSpPr/>
-          <p:nvPr/>
-        </p:nvSpPr>
-        <p:spPr>
-          <a:xfrm>
-            <a:off x="4648200" y="1371600"/>
-            <a:ext cx="4038600" cy="5105400"/>
-          </a:xfrm>
-          <a:prstGeom prst="roundRect">
-            <a:avLst/>
-          </a:prstGeom>
-          <a:solidFill>
-            <a:schemeClr val="accent2">
-              <a:lumMod val="40000"/>
-              <a:lumOff val="60000"/>
-            </a:schemeClr>
-          </a:solidFill>
-        </p:spPr>
-        <p:style>
-          <a:lnRef idx="2">
-            <a:schemeClr val="accent1">
-              <a:shade val="50000"/>
-            </a:schemeClr>
-          </a:lnRef>
-          <a:fillRef idx="1">
-            <a:schemeClr val="accent1"/>
-          </a:fillRef>
-          <a:effectRef idx="0">
-            <a:schemeClr val="accent1"/>
-          </a:effectRef>
-          <a:fontRef idx="minor">
-            <a:schemeClr val="lt1"/>
-          </a:fontRef>
-        </p:style>
-        <p:txBody>
-          <a:bodyPr rtlCol="0" anchor="ctr"/>
-          <a:lstStyle/>
-          <a:p>
-            <a:pPr algn="ctr"/>
-            <a:endParaRPr lang="en-US"/>
-          </a:p>
-        </p:txBody>
-      </p:sp>
-      <p:sp>
-        <p:nvSpPr>
-          <p:cNvPr id="9" name="Rounded Rectangle 8"/>
-          <p:cNvSpPr/>
-          <p:nvPr/>
-        </p:nvSpPr>
-        <p:spPr>
-          <a:xfrm>
-            <a:off x="457200" y="1371600"/>
-            <a:ext cx="4038600" cy="5105400"/>
-          </a:xfrm>
-          <a:prstGeom prst="roundRect">
-            <a:avLst/>
-          </a:prstGeom>
-          <a:solidFill>
-            <a:schemeClr val="accent4">
-              <a:lumMod val="40000"/>
-              <a:lumOff val="60000"/>
-            </a:schemeClr>
-          </a:solidFill>
-        </p:spPr>
-        <p:style>
-          <a:lnRef idx="2">
-            <a:schemeClr val="accent1">
-              <a:shade val="50000"/>
-            </a:schemeClr>
-          </a:lnRef>
-          <a:fillRef idx="1">
-            <a:schemeClr val="accent1"/>
-          </a:fillRef>
-          <a:effectRef idx="0">
-            <a:schemeClr val="accent1"/>
-          </a:effectRef>
-          <a:fontRef idx="minor">
-            <a:schemeClr val="lt1"/>
-          </a:fontRef>
-        </p:style>
-        <p:txBody>
-          <a:bodyPr rtlCol="0" anchor="ctr"/>
-          <a:lstStyle/>
-          <a:p>
-            <a:pPr algn="ctr"/>
-            <a:endParaRPr lang="en-US"/>
-          </a:p>
-        </p:txBody>
-      </p:sp>
-      <p:sp>
-        <p:nvSpPr>
-          <p:cNvPr id="2" name="Title 1"/>
-          <p:cNvSpPr>
-            <a:spLocks noGrp="1"/>
-          </p:cNvSpPr>
-          <p:nvPr>
-            <p:ph type="title"/>
-          </p:nvPr>
-        </p:nvSpPr>
-        <p:spPr/>
-        <p:txBody>
-          <a:bodyPr/>
-          <a:lstStyle/>
-          <a:p>
-            <a:r>
-              <a:rPr lang="en-US" dirty="0" smtClean="0"/>
-              <a:t>Prior Research</a:t>
-            </a:r>
-            <a:endParaRPr lang="en-US" dirty="0"/>
-          </a:p>
-        </p:txBody>
-      </p:sp>
-      <p:sp>
-        <p:nvSpPr>
-          <p:cNvPr id="4" name="Text Placeholder 3"/>
-          <p:cNvSpPr>
-            <a:spLocks noGrp="1"/>
-          </p:cNvSpPr>
-          <p:nvPr>
-            <p:ph type="body" idx="1"/>
-          </p:nvPr>
-        </p:nvSpPr>
-        <p:spPr/>
-        <p:txBody>
-          <a:bodyPr>
-            <a:normAutofit/>
-          </a:bodyPr>
-          <a:lstStyle/>
-          <a:p>
-            <a:pPr algn="ctr"/>
-            <a:r>
-              <a:rPr lang="en-US" sz="2800" u="sng" dirty="0" smtClean="0"/>
-              <a:t>Ad Hoc Implicature</a:t>
-            </a:r>
-            <a:endParaRPr lang="en-US" sz="2800" u="sng" dirty="0"/>
-          </a:p>
-        </p:txBody>
-      </p:sp>
-      <p:sp>
-        <p:nvSpPr>
-          <p:cNvPr id="5" name="Content Placeholder 4"/>
-          <p:cNvSpPr>
-            <a:spLocks noGrp="1"/>
-          </p:cNvSpPr>
-          <p:nvPr>
-            <p:ph sz="half" idx="2"/>
-          </p:nvPr>
-        </p:nvSpPr>
-        <p:spPr/>
-        <p:txBody>
-          <a:bodyPr/>
-          <a:lstStyle/>
-          <a:p>
-            <a:endParaRPr lang="en-US"/>
-          </a:p>
-        </p:txBody>
-      </p:sp>
-      <p:sp>
-        <p:nvSpPr>
-          <p:cNvPr id="6" name="Text Placeholder 5"/>
-          <p:cNvSpPr>
-            <a:spLocks noGrp="1"/>
-          </p:cNvSpPr>
-          <p:nvPr>
-            <p:ph type="body" sz="quarter" idx="3"/>
-          </p:nvPr>
-        </p:nvSpPr>
-        <p:spPr/>
-        <p:txBody>
-          <a:bodyPr>
-            <a:normAutofit/>
-          </a:bodyPr>
-          <a:lstStyle/>
-          <a:p>
-            <a:pPr algn="ctr"/>
-            <a:r>
-              <a:rPr lang="en-US" sz="2800" u="sng" dirty="0" smtClean="0"/>
-              <a:t>Negation</a:t>
-            </a:r>
-            <a:endParaRPr lang="en-US" sz="2800" u="sng" dirty="0"/>
-          </a:p>
-        </p:txBody>
-      </p:sp>
-      <p:sp>
-        <p:nvSpPr>
-          <p:cNvPr id="7" name="Content Placeholder 6"/>
-          <p:cNvSpPr>
-            <a:spLocks noGrp="1"/>
-          </p:cNvSpPr>
-          <p:nvPr>
-            <p:ph sz="quarter" idx="4"/>
-          </p:nvPr>
-        </p:nvSpPr>
-        <p:spPr/>
-        <p:txBody>
-          <a:bodyPr/>
-          <a:lstStyle/>
-          <a:p>
-            <a:endParaRPr lang="en-US" dirty="0"/>
-          </a:p>
-        </p:txBody>
-      </p:sp>
-    </p:spTree>
-    <p:extLst>
-      <p:ext uri="{BB962C8B-B14F-4D97-AF65-F5344CB8AC3E}">
-        <p14:creationId xmlns:p14="http://schemas.microsoft.com/office/powerpoint/2010/main" val="4110311647"/>
-      </p:ext>
-    </p:extLst>
-  </p:cSld>
-  <p:clrMapOvr>
-    <a:masterClrMapping/>
-  </p:clrMapOvr>
-  <p:timing>
-    <p:tnLst>
-      <p:par>
-        <p:cTn id="1" dur="indefinite" restart="never" nodeType="tmRoot"/>
-      </p:par>
-    </p:tnLst>
-  </p:timing>
-</p:sld>
-</file>
-
-<file path=ppt/slides/slide4.xml><?xml version="1.0" encoding="utf-8"?>
-<p:sld xmlns:a="http://schemas.openxmlformats.org/drawingml/2006/main" xmlns:r="http://schemas.openxmlformats.org/officeDocument/2006/relationships" xmlns:p="http://schemas.openxmlformats.org/presentationml/2006/main">
+<file path=ppt/slides/slide16.xml><?xml version="1.0" encoding="utf-8"?>
+<p:sld xmlns:a="http://schemas.openxmlformats.org/drawingml/2006/main" xmlns:r="http://schemas.openxmlformats.org/officeDocument/2006/relationships" xmlns:p="http://schemas.openxmlformats.org/presentationml/2006/main" show="0">
   <p:cSld>
     <p:bg>
       <p:bgPr>
@@ -9184,6 +8926,14 @@
   <p:clrMapOvr>
     <a:masterClrMapping/>
   </p:clrMapOvr>
+  <mc:AlternateContent xmlns:mc="http://schemas.openxmlformats.org/markup-compatibility/2006">
+    <mc:Choice xmlns:p14="http://schemas.microsoft.com/office/powerpoint/2010/main" Requires="p14">
+      <p:transition spd="slow" p14:dur="2000"/>
+    </mc:Choice>
+    <mc:Fallback>
+      <p:transition spd="slow"/>
+    </mc:Fallback>
+  </mc:AlternateContent>
   <p:timing>
     <p:tnLst>
       <p:par>
@@ -9194,7 +8944,1073 @@
 </p:sld>
 </file>
 
+<file path=ppt/slides/slide17.xml><?xml version="1.0" encoding="utf-8"?>
+<p:sld xmlns:a="http://schemas.openxmlformats.org/drawingml/2006/main" xmlns:r="http://schemas.openxmlformats.org/officeDocument/2006/relationships" xmlns:p="http://schemas.openxmlformats.org/presentationml/2006/main" show="0">
+  <p:cSld>
+    <p:spTree>
+      <p:nvGrpSpPr>
+        <p:cNvPr id="1" name=""/>
+        <p:cNvGrpSpPr/>
+        <p:nvPr/>
+      </p:nvGrpSpPr>
+      <p:grpSpPr>
+        <a:xfrm>
+          <a:off x="0" y="0"/>
+          <a:ext cx="0" cy="0"/>
+          <a:chOff x="0" y="0"/>
+          <a:chExt cx="0" cy="0"/>
+        </a:xfrm>
+      </p:grpSpPr>
+      <p:pic>
+        <p:nvPicPr>
+          <p:cNvPr id="4" name="Content Placeholder 3"/>
+          <p:cNvPicPr>
+            <a:picLocks noGrp="1" noChangeAspect="1"/>
+          </p:cNvPicPr>
+          <p:nvPr>
+            <p:ph idx="4294967295"/>
+          </p:nvPr>
+        </p:nvPicPr>
+        <p:blipFill rotWithShape="1">
+          <a:blip r:embed="rId2">
+            <a:extLst>
+              <a:ext uri="{28A0092B-C50C-407E-A947-70E740481C1C}">
+                <a14:useLocalDpi xmlns:a14="http://schemas.microsoft.com/office/drawing/2010/main" val="0"/>
+              </a:ext>
+            </a:extLst>
+          </a:blip>
+          <a:srcRect l="18798" r="19002" b="3579"/>
+          <a:stretch/>
+        </p:blipFill>
+        <p:spPr>
+          <a:xfrm>
+            <a:off x="1181100" y="357482"/>
+            <a:ext cx="6781800" cy="6195718"/>
+          </a:xfrm>
+        </p:spPr>
+      </p:pic>
+    </p:spTree>
+    <p:extLst>
+      <p:ext uri="{BB962C8B-B14F-4D97-AF65-F5344CB8AC3E}">
+        <p14:creationId xmlns:p14="http://schemas.microsoft.com/office/powerpoint/2010/main" val="2002289379"/>
+      </p:ext>
+    </p:extLst>
+  </p:cSld>
+  <p:clrMapOvr>
+    <a:masterClrMapping/>
+  </p:clrMapOvr>
+  <mc:AlternateContent xmlns:mc="http://schemas.openxmlformats.org/markup-compatibility/2006">
+    <mc:Choice xmlns:p14="http://schemas.microsoft.com/office/powerpoint/2010/main" Requires="p14">
+      <p:transition spd="slow" p14:dur="2000"/>
+    </mc:Choice>
+    <mc:Fallback>
+      <p:transition spd="slow"/>
+    </mc:Fallback>
+  </mc:AlternateContent>
+  <p:timing>
+    <p:tnLst>
+      <p:par>
+        <p:cTn id="1" dur="indefinite" restart="never" nodeType="tmRoot"/>
+      </p:par>
+    </p:tnLst>
+  </p:timing>
+</p:sld>
+</file>
+
+<file path=ppt/slides/slide2.xml><?xml version="1.0" encoding="utf-8"?>
+<p:sld xmlns:a="http://schemas.openxmlformats.org/drawingml/2006/main" xmlns:r="http://schemas.openxmlformats.org/officeDocument/2006/relationships" xmlns:p="http://schemas.openxmlformats.org/presentationml/2006/main">
+  <p:cSld>
+    <p:spTree>
+      <p:nvGrpSpPr>
+        <p:cNvPr id="1" name=""/>
+        <p:cNvGrpSpPr/>
+        <p:nvPr/>
+      </p:nvGrpSpPr>
+      <p:grpSpPr>
+        <a:xfrm>
+          <a:off x="0" y="0"/>
+          <a:ext cx="0" cy="0"/>
+          <a:chOff x="0" y="0"/>
+          <a:chExt cx="0" cy="0"/>
+        </a:xfrm>
+      </p:grpSpPr>
+      <p:sp>
+        <p:nvSpPr>
+          <p:cNvPr id="2" name="Title 1"/>
+          <p:cNvSpPr>
+            <a:spLocks noGrp="1"/>
+          </p:cNvSpPr>
+          <p:nvPr>
+            <p:ph type="title"/>
+          </p:nvPr>
+        </p:nvSpPr>
+        <p:spPr/>
+        <p:txBody>
+          <a:bodyPr/>
+          <a:lstStyle/>
+          <a:p>
+            <a:r>
+              <a:rPr lang="en-US" dirty="0" smtClean="0"/>
+              <a:t>Inhibition</a:t>
+            </a:r>
+            <a:endParaRPr lang="en-US" dirty="0"/>
+          </a:p>
+        </p:txBody>
+      </p:sp>
+      <p:sp>
+        <p:nvSpPr>
+          <p:cNvPr id="3" name="Content Placeholder 2"/>
+          <p:cNvSpPr>
+            <a:spLocks noGrp="1"/>
+          </p:cNvSpPr>
+          <p:nvPr>
+            <p:ph idx="1"/>
+          </p:nvPr>
+        </p:nvSpPr>
+        <p:spPr/>
+        <p:txBody>
+          <a:bodyPr/>
+          <a:lstStyle/>
+          <a:p>
+            <a:r>
+              <a:rPr lang="en-US" dirty="0" smtClean="0"/>
+              <a:t>One’s ability to control behaviors, reactions, and disregard other stimuli in one’s environment</a:t>
+            </a:r>
+          </a:p>
+          <a:p>
+            <a:pPr lvl="1"/>
+            <a:r>
+              <a:rPr lang="en-US" dirty="0" smtClean="0"/>
+              <a:t>A general cognitive domain, independent of language</a:t>
+            </a:r>
+          </a:p>
+          <a:p>
+            <a:endParaRPr lang="en-US" dirty="0"/>
+          </a:p>
+          <a:p>
+            <a:r>
+              <a:rPr lang="en-US" dirty="0" smtClean="0"/>
+              <a:t>Children generally have trouble with inhibition</a:t>
+            </a:r>
+            <a:endParaRPr lang="en-US" dirty="0"/>
+          </a:p>
+        </p:txBody>
+      </p:sp>
+    </p:spTree>
+    <p:extLst>
+      <p:ext uri="{BB962C8B-B14F-4D97-AF65-F5344CB8AC3E}">
+        <p14:creationId xmlns:p14="http://schemas.microsoft.com/office/powerpoint/2010/main" val="3651191028"/>
+      </p:ext>
+    </p:extLst>
+  </p:cSld>
+  <p:clrMapOvr>
+    <a:masterClrMapping/>
+  </p:clrMapOvr>
+</p:sld>
+</file>
+
+<file path=ppt/slides/slide3.xml><?xml version="1.0" encoding="utf-8"?>
+<p:sld xmlns:a="http://schemas.openxmlformats.org/drawingml/2006/main" xmlns:r="http://schemas.openxmlformats.org/officeDocument/2006/relationships" xmlns:p="http://schemas.openxmlformats.org/presentationml/2006/main">
+  <p:cSld>
+    <p:spTree>
+      <p:nvGrpSpPr>
+        <p:cNvPr id="1" name=""/>
+        <p:cNvGrpSpPr/>
+        <p:nvPr/>
+      </p:nvGrpSpPr>
+      <p:grpSpPr>
+        <a:xfrm>
+          <a:off x="0" y="0"/>
+          <a:ext cx="0" cy="0"/>
+          <a:chOff x="0" y="0"/>
+          <a:chExt cx="0" cy="0"/>
+        </a:xfrm>
+      </p:grpSpPr>
+      <p:sp>
+        <p:nvSpPr>
+          <p:cNvPr id="2" name="Title 1"/>
+          <p:cNvSpPr>
+            <a:spLocks noGrp="1"/>
+          </p:cNvSpPr>
+          <p:nvPr>
+            <p:ph type="title"/>
+          </p:nvPr>
+        </p:nvSpPr>
+        <p:spPr/>
+        <p:txBody>
+          <a:bodyPr/>
+          <a:lstStyle/>
+          <a:p>
+            <a:r>
+              <a:rPr lang="en-US" dirty="0" smtClean="0"/>
+              <a:t>Prior Work: Negation</a:t>
+            </a:r>
+            <a:endParaRPr lang="en-US" dirty="0"/>
+          </a:p>
+        </p:txBody>
+      </p:sp>
+      <p:pic>
+        <p:nvPicPr>
+          <p:cNvPr id="4" name="Content Placeholder 3"/>
+          <p:cNvPicPr>
+            <a:picLocks noGrp="1" noChangeAspect="1"/>
+          </p:cNvPicPr>
+          <p:nvPr>
+            <p:ph idx="1"/>
+          </p:nvPr>
+        </p:nvPicPr>
+        <p:blipFill>
+          <a:blip r:embed="rId2">
+            <a:extLst>
+              <a:ext uri="{28A0092B-C50C-407E-A947-70E740481C1C}">
+                <a14:useLocalDpi xmlns:a14="http://schemas.microsoft.com/office/drawing/2010/main" val="0"/>
+              </a:ext>
+            </a:extLst>
+          </a:blip>
+          <a:stretch>
+            <a:fillRect/>
+          </a:stretch>
+        </p:blipFill>
+        <p:spPr>
+          <a:xfrm>
+            <a:off x="509020" y="2409544"/>
+            <a:ext cx="8125960" cy="2010056"/>
+          </a:xfrm>
+        </p:spPr>
+      </p:pic>
+      <p:sp>
+        <p:nvSpPr>
+          <p:cNvPr id="5" name="TextBox 4"/>
+          <p:cNvSpPr txBox="1"/>
+          <p:nvPr/>
+        </p:nvSpPr>
+        <p:spPr>
+          <a:xfrm>
+            <a:off x="6096000" y="6183868"/>
+            <a:ext cx="2743200" cy="369332"/>
+          </a:xfrm>
+          <a:prstGeom prst="rect">
+            <a:avLst/>
+          </a:prstGeom>
+          <a:noFill/>
+        </p:spPr>
+        <p:txBody>
+          <a:bodyPr wrap="square" rtlCol="0">
+            <a:spAutoFit/>
+          </a:bodyPr>
+          <a:lstStyle/>
+          <a:p>
+            <a:r>
+              <a:rPr lang="en-US" dirty="0" smtClean="0"/>
+              <a:t>(Frank &amp; Nordmeyer, 2014)</a:t>
+            </a:r>
+            <a:endParaRPr lang="en-US" dirty="0"/>
+          </a:p>
+        </p:txBody>
+      </p:sp>
+    </p:spTree>
+    <p:extLst>
+      <p:ext uri="{BB962C8B-B14F-4D97-AF65-F5344CB8AC3E}">
+        <p14:creationId xmlns:p14="http://schemas.microsoft.com/office/powerpoint/2010/main" val="2994057518"/>
+      </p:ext>
+    </p:extLst>
+  </p:cSld>
+  <p:clrMapOvr>
+    <a:masterClrMapping/>
+  </p:clrMapOvr>
+</p:sld>
+</file>
+
+<file path=ppt/slides/slide4.xml><?xml version="1.0" encoding="utf-8"?>
+<p:sld xmlns:a="http://schemas.openxmlformats.org/drawingml/2006/main" xmlns:r="http://schemas.openxmlformats.org/officeDocument/2006/relationships" xmlns:p="http://schemas.openxmlformats.org/presentationml/2006/main">
+  <p:cSld>
+    <p:spTree>
+      <p:nvGrpSpPr>
+        <p:cNvPr id="1" name=""/>
+        <p:cNvGrpSpPr/>
+        <p:nvPr/>
+      </p:nvGrpSpPr>
+      <p:grpSpPr>
+        <a:xfrm>
+          <a:off x="0" y="0"/>
+          <a:ext cx="0" cy="0"/>
+          <a:chOff x="0" y="0"/>
+          <a:chExt cx="0" cy="0"/>
+        </a:xfrm>
+      </p:grpSpPr>
+      <p:sp>
+        <p:nvSpPr>
+          <p:cNvPr id="2" name="Title 1"/>
+          <p:cNvSpPr>
+            <a:spLocks noGrp="1"/>
+          </p:cNvSpPr>
+          <p:nvPr>
+            <p:ph type="title"/>
+          </p:nvPr>
+        </p:nvSpPr>
+        <p:spPr/>
+        <p:txBody>
+          <a:bodyPr/>
+          <a:lstStyle/>
+          <a:p>
+            <a:r>
+              <a:rPr lang="en-US" dirty="0" smtClean="0"/>
+              <a:t>Prior Work: Ad Hoc Implicature</a:t>
+            </a:r>
+            <a:endParaRPr lang="en-US" dirty="0"/>
+          </a:p>
+        </p:txBody>
+      </p:sp>
+      <p:pic>
+        <p:nvPicPr>
+          <p:cNvPr id="4" name="Content Placeholder 3"/>
+          <p:cNvPicPr>
+            <a:picLocks noGrp="1" noChangeAspect="1"/>
+          </p:cNvPicPr>
+          <p:nvPr>
+            <p:ph idx="1"/>
+          </p:nvPr>
+        </p:nvPicPr>
+        <p:blipFill rotWithShape="1">
+          <a:blip r:embed="rId2">
+            <a:extLst>
+              <a:ext uri="{28A0092B-C50C-407E-A947-70E740481C1C}">
+                <a14:useLocalDpi xmlns:a14="http://schemas.microsoft.com/office/drawing/2010/main" val="0"/>
+              </a:ext>
+            </a:extLst>
+          </a:blip>
+          <a:srcRect l="2359" t="10442" r="69508" b="9722"/>
+          <a:stretch/>
+        </p:blipFill>
+        <p:spPr>
+          <a:xfrm>
+            <a:off x="304800" y="1524000"/>
+            <a:ext cx="2753893" cy="1828800"/>
+          </a:xfrm>
+        </p:spPr>
+      </p:pic>
+      <p:pic>
+        <p:nvPicPr>
+          <p:cNvPr id="5" name="Picture 4"/>
+          <p:cNvPicPr>
+            <a:picLocks noChangeAspect="1"/>
+          </p:cNvPicPr>
+          <p:nvPr/>
+        </p:nvPicPr>
+        <p:blipFill rotWithShape="1">
+          <a:blip r:embed="rId2">
+            <a:extLst>
+              <a:ext uri="{28A0092B-C50C-407E-A947-70E740481C1C}">
+                <a14:useLocalDpi xmlns:a14="http://schemas.microsoft.com/office/drawing/2010/main" val="0"/>
+              </a:ext>
+            </a:extLst>
+          </a:blip>
+          <a:srcRect l="35815" t="9689" r="36349" b="9437"/>
+          <a:stretch/>
+        </p:blipFill>
+        <p:spPr>
+          <a:xfrm>
+            <a:off x="3200400" y="2895600"/>
+            <a:ext cx="2689652" cy="1828800"/>
+          </a:xfrm>
+          <a:prstGeom prst="rect">
+            <a:avLst/>
+          </a:prstGeom>
+        </p:spPr>
+      </p:pic>
+      <p:pic>
+        <p:nvPicPr>
+          <p:cNvPr id="6" name="Picture 5"/>
+          <p:cNvPicPr>
+            <a:picLocks noChangeAspect="1"/>
+          </p:cNvPicPr>
+          <p:nvPr/>
+        </p:nvPicPr>
+        <p:blipFill rotWithShape="1">
+          <a:blip r:embed="rId2">
+            <a:extLst>
+              <a:ext uri="{28A0092B-C50C-407E-A947-70E740481C1C}">
+                <a14:useLocalDpi xmlns:a14="http://schemas.microsoft.com/office/drawing/2010/main" val="0"/>
+              </a:ext>
+            </a:extLst>
+          </a:blip>
+          <a:srcRect l="69269" t="11574" r="2345" b="11111"/>
+          <a:stretch/>
+        </p:blipFill>
+        <p:spPr>
+          <a:xfrm>
+            <a:off x="6046264" y="4267200"/>
+            <a:ext cx="2869136" cy="1828800"/>
+          </a:xfrm>
+          <a:prstGeom prst="rect">
+            <a:avLst/>
+          </a:prstGeom>
+        </p:spPr>
+      </p:pic>
+      <p:sp>
+        <p:nvSpPr>
+          <p:cNvPr id="7" name="TextBox 6"/>
+          <p:cNvSpPr txBox="1"/>
+          <p:nvPr/>
+        </p:nvSpPr>
+        <p:spPr>
+          <a:xfrm>
+            <a:off x="6324600" y="6324600"/>
+            <a:ext cx="2743200" cy="369332"/>
+          </a:xfrm>
+          <a:prstGeom prst="rect">
+            <a:avLst/>
+          </a:prstGeom>
+          <a:noFill/>
+        </p:spPr>
+        <p:txBody>
+          <a:bodyPr wrap="square" rtlCol="0">
+            <a:spAutoFit/>
+          </a:bodyPr>
+          <a:lstStyle/>
+          <a:p>
+            <a:r>
+              <a:rPr lang="en-US" dirty="0" smtClean="0"/>
+              <a:t>(Frank, Wu, &amp; Yoon, 2015)</a:t>
+            </a:r>
+            <a:endParaRPr lang="en-US" dirty="0"/>
+          </a:p>
+        </p:txBody>
+      </p:sp>
+    </p:spTree>
+    <p:extLst>
+      <p:ext uri="{BB962C8B-B14F-4D97-AF65-F5344CB8AC3E}">
+        <p14:creationId xmlns:p14="http://schemas.microsoft.com/office/powerpoint/2010/main" val="22124641"/>
+      </p:ext>
+    </p:extLst>
+  </p:cSld>
+  <p:clrMapOvr>
+    <a:masterClrMapping/>
+  </p:clrMapOvr>
+</p:sld>
+</file>
+
 <file path=ppt/slides/slide5.xml><?xml version="1.0" encoding="utf-8"?>
+<p:sld xmlns:a="http://schemas.openxmlformats.org/drawingml/2006/main" xmlns:r="http://schemas.openxmlformats.org/officeDocument/2006/relationships" xmlns:p="http://schemas.openxmlformats.org/presentationml/2006/main">
+  <p:cSld>
+    <p:spTree>
+      <p:nvGrpSpPr>
+        <p:cNvPr id="1" name=""/>
+        <p:cNvGrpSpPr/>
+        <p:nvPr/>
+      </p:nvGrpSpPr>
+      <p:grpSpPr>
+        <a:xfrm>
+          <a:off x="0" y="0"/>
+          <a:ext cx="0" cy="0"/>
+          <a:chOff x="0" y="0"/>
+          <a:chExt cx="0" cy="0"/>
+        </a:xfrm>
+      </p:grpSpPr>
+      <p:sp>
+        <p:nvSpPr>
+          <p:cNvPr id="2" name="Title 1"/>
+          <p:cNvSpPr>
+            <a:spLocks noGrp="1"/>
+          </p:cNvSpPr>
+          <p:nvPr>
+            <p:ph type="title"/>
+          </p:nvPr>
+        </p:nvSpPr>
+        <p:spPr/>
+        <p:txBody>
+          <a:bodyPr/>
+          <a:lstStyle/>
+          <a:p>
+            <a:r>
+              <a:rPr lang="en-US" dirty="0" smtClean="0"/>
+              <a:t>Research Question</a:t>
+            </a:r>
+            <a:endParaRPr lang="en-US" dirty="0"/>
+          </a:p>
+        </p:txBody>
+      </p:sp>
+      <p:sp>
+        <p:nvSpPr>
+          <p:cNvPr id="3" name="Content Placeholder 2"/>
+          <p:cNvSpPr>
+            <a:spLocks noGrp="1"/>
+          </p:cNvSpPr>
+          <p:nvPr>
+            <p:ph idx="1"/>
+          </p:nvPr>
+        </p:nvSpPr>
+        <p:spPr>
+          <a:xfrm>
+            <a:off x="457200" y="1600200"/>
+            <a:ext cx="8229600" cy="1981200"/>
+          </a:xfrm>
+        </p:spPr>
+        <p:txBody>
+          <a:bodyPr/>
+          <a:lstStyle/>
+          <a:p>
+            <a:pPr marL="0" indent="0" algn="ctr">
+              <a:buNone/>
+            </a:pPr>
+            <a:r>
+              <a:rPr lang="en-US" dirty="0" smtClean="0"/>
+              <a:t>Could a child’s ability for inhibition be correlated with their success in comprehending negation and ad hoc implicature?</a:t>
+            </a:r>
+            <a:endParaRPr lang="en-US" dirty="0"/>
+          </a:p>
+        </p:txBody>
+      </p:sp>
+    </p:spTree>
+    <p:extLst>
+      <p:ext uri="{BB962C8B-B14F-4D97-AF65-F5344CB8AC3E}">
+        <p14:creationId xmlns:p14="http://schemas.microsoft.com/office/powerpoint/2010/main" val="3254368476"/>
+      </p:ext>
+    </p:extLst>
+  </p:cSld>
+  <p:clrMapOvr>
+    <a:masterClrMapping/>
+  </p:clrMapOvr>
+</p:sld>
+</file>
+
+<file path=ppt/slides/slide6.xml><?xml version="1.0" encoding="utf-8"?>
+<p:sld xmlns:a="http://schemas.openxmlformats.org/drawingml/2006/main" xmlns:r="http://schemas.openxmlformats.org/officeDocument/2006/relationships" xmlns:p="http://schemas.openxmlformats.org/presentationml/2006/main">
+  <p:cSld>
+    <p:spTree>
+      <p:nvGrpSpPr>
+        <p:cNvPr id="1" name=""/>
+        <p:cNvGrpSpPr/>
+        <p:nvPr/>
+      </p:nvGrpSpPr>
+      <p:grpSpPr>
+        <a:xfrm>
+          <a:off x="0" y="0"/>
+          <a:ext cx="0" cy="0"/>
+          <a:chOff x="0" y="0"/>
+          <a:chExt cx="0" cy="0"/>
+        </a:xfrm>
+      </p:grpSpPr>
+      <p:sp>
+        <p:nvSpPr>
+          <p:cNvPr id="16" name="Rounded Rectangle 15"/>
+          <p:cNvSpPr/>
+          <p:nvPr/>
+        </p:nvSpPr>
+        <p:spPr>
+          <a:xfrm>
+            <a:off x="762000" y="4722167"/>
+            <a:ext cx="7696200" cy="1524000"/>
+          </a:xfrm>
+          <a:prstGeom prst="roundRect">
+            <a:avLst/>
+          </a:prstGeom>
+          <a:solidFill>
+            <a:schemeClr val="accent2">
+              <a:lumMod val="40000"/>
+              <a:lumOff val="60000"/>
+            </a:schemeClr>
+          </a:solidFill>
+        </p:spPr>
+        <p:style>
+          <a:lnRef idx="2">
+            <a:schemeClr val="accent1">
+              <a:shade val="50000"/>
+            </a:schemeClr>
+          </a:lnRef>
+          <a:fillRef idx="1">
+            <a:schemeClr val="accent1"/>
+          </a:fillRef>
+          <a:effectRef idx="0">
+            <a:schemeClr val="accent1"/>
+          </a:effectRef>
+          <a:fontRef idx="minor">
+            <a:schemeClr val="lt1"/>
+          </a:fontRef>
+        </p:style>
+        <p:txBody>
+          <a:bodyPr rtlCol="0" anchor="ctr"/>
+          <a:lstStyle/>
+          <a:p>
+            <a:pPr algn="ctr"/>
+            <a:endParaRPr lang="en-US"/>
+          </a:p>
+        </p:txBody>
+      </p:sp>
+      <p:sp>
+        <p:nvSpPr>
+          <p:cNvPr id="15" name="Rounded Rectangle 14"/>
+          <p:cNvSpPr/>
+          <p:nvPr/>
+        </p:nvSpPr>
+        <p:spPr>
+          <a:xfrm>
+            <a:off x="762000" y="3048000"/>
+            <a:ext cx="7696200" cy="1524000"/>
+          </a:xfrm>
+          <a:prstGeom prst="roundRect">
+            <a:avLst/>
+          </a:prstGeom>
+          <a:solidFill>
+            <a:schemeClr val="accent4">
+              <a:lumMod val="40000"/>
+              <a:lumOff val="60000"/>
+            </a:schemeClr>
+          </a:solidFill>
+        </p:spPr>
+        <p:style>
+          <a:lnRef idx="2">
+            <a:schemeClr val="accent1">
+              <a:shade val="50000"/>
+            </a:schemeClr>
+          </a:lnRef>
+          <a:fillRef idx="1">
+            <a:schemeClr val="accent1"/>
+          </a:fillRef>
+          <a:effectRef idx="0">
+            <a:schemeClr val="accent1"/>
+          </a:effectRef>
+          <a:fontRef idx="minor">
+            <a:schemeClr val="lt1"/>
+          </a:fontRef>
+        </p:style>
+        <p:txBody>
+          <a:bodyPr rtlCol="0" anchor="ctr"/>
+          <a:lstStyle/>
+          <a:p>
+            <a:pPr algn="ctr"/>
+            <a:endParaRPr lang="en-US"/>
+          </a:p>
+        </p:txBody>
+      </p:sp>
+      <p:sp>
+        <p:nvSpPr>
+          <p:cNvPr id="14" name="Rounded Rectangle 13"/>
+          <p:cNvSpPr/>
+          <p:nvPr/>
+        </p:nvSpPr>
+        <p:spPr>
+          <a:xfrm>
+            <a:off x="762000" y="1371600"/>
+            <a:ext cx="7696200" cy="1524000"/>
+          </a:xfrm>
+          <a:prstGeom prst="roundRect">
+            <a:avLst/>
+          </a:prstGeom>
+          <a:solidFill>
+            <a:schemeClr val="accent3">
+              <a:lumMod val="60000"/>
+              <a:lumOff val="40000"/>
+            </a:schemeClr>
+          </a:solidFill>
+        </p:spPr>
+        <p:style>
+          <a:lnRef idx="2">
+            <a:schemeClr val="accent1">
+              <a:shade val="50000"/>
+            </a:schemeClr>
+          </a:lnRef>
+          <a:fillRef idx="1">
+            <a:schemeClr val="accent1"/>
+          </a:fillRef>
+          <a:effectRef idx="0">
+            <a:schemeClr val="accent1"/>
+          </a:effectRef>
+          <a:fontRef idx="minor">
+            <a:schemeClr val="lt1"/>
+          </a:fontRef>
+        </p:style>
+        <p:txBody>
+          <a:bodyPr rtlCol="0" anchor="ctr"/>
+          <a:lstStyle/>
+          <a:p>
+            <a:pPr algn="ctr"/>
+            <a:endParaRPr lang="en-US"/>
+          </a:p>
+        </p:txBody>
+      </p:sp>
+      <p:sp>
+        <p:nvSpPr>
+          <p:cNvPr id="2" name="Title 1"/>
+          <p:cNvSpPr>
+            <a:spLocks noGrp="1"/>
+          </p:cNvSpPr>
+          <p:nvPr>
+            <p:ph type="title"/>
+          </p:nvPr>
+        </p:nvSpPr>
+        <p:spPr/>
+        <p:txBody>
+          <a:bodyPr>
+            <a:normAutofit/>
+          </a:bodyPr>
+          <a:lstStyle/>
+          <a:p>
+            <a:r>
+              <a:rPr lang="en-US" dirty="0" smtClean="0"/>
+              <a:t>Experiment Phases</a:t>
+            </a:r>
+            <a:endParaRPr lang="en-US" dirty="0"/>
+          </a:p>
+        </p:txBody>
+      </p:sp>
+      <p:pic>
+        <p:nvPicPr>
+          <p:cNvPr id="6" name="Picture 5"/>
+          <p:cNvPicPr>
+            <a:picLocks noChangeAspect="1"/>
+          </p:cNvPicPr>
+          <p:nvPr/>
+        </p:nvPicPr>
+        <p:blipFill>
+          <a:blip r:embed="rId2" cstate="print">
+            <a:extLst>
+              <a:ext uri="{BEBA8EAE-BF5A-486C-A8C5-ECC9F3942E4B}">
+                <a14:imgProps xmlns:a14="http://schemas.microsoft.com/office/drawing/2010/main">
+                  <a14:imgLayer r:embed="rId3">
+                    <a14:imgEffect>
+                      <a14:backgroundRemoval t="10000" b="90000" l="10000" r="90000"/>
+                    </a14:imgEffect>
+                  </a14:imgLayer>
+                </a14:imgProps>
+              </a:ext>
+              <a:ext uri="{28A0092B-C50C-407E-A947-70E740481C1C}">
+                <a14:useLocalDpi xmlns:a14="http://schemas.microsoft.com/office/drawing/2010/main" val="0"/>
+              </a:ext>
+            </a:extLst>
+          </a:blip>
+          <a:stretch>
+            <a:fillRect/>
+          </a:stretch>
+        </p:blipFill>
+        <p:spPr>
+          <a:xfrm>
+            <a:off x="3200399" y="3002280"/>
+            <a:ext cx="1759694" cy="1645920"/>
+          </a:xfrm>
+          <a:prstGeom prst="rect">
+            <a:avLst/>
+          </a:prstGeom>
+        </p:spPr>
+      </p:pic>
+      <p:pic>
+        <p:nvPicPr>
+          <p:cNvPr id="7" name="Picture 6"/>
+          <p:cNvPicPr>
+            <a:picLocks noChangeAspect="1"/>
+          </p:cNvPicPr>
+          <p:nvPr/>
+        </p:nvPicPr>
+        <p:blipFill>
+          <a:blip r:embed="rId4" cstate="print">
+            <a:extLst>
+              <a:ext uri="{BEBA8EAE-BF5A-486C-A8C5-ECC9F3942E4B}">
+                <a14:imgProps xmlns:a14="http://schemas.microsoft.com/office/drawing/2010/main">
+                  <a14:imgLayer r:embed="rId5">
+                    <a14:imgEffect>
+                      <a14:backgroundRemoval t="10000" b="90000" l="10000" r="90000"/>
+                    </a14:imgEffect>
+                  </a14:imgLayer>
+                </a14:imgProps>
+              </a:ext>
+              <a:ext uri="{28A0092B-C50C-407E-A947-70E740481C1C}">
+                <a14:useLocalDpi xmlns:a14="http://schemas.microsoft.com/office/drawing/2010/main" val="0"/>
+              </a:ext>
+            </a:extLst>
+          </a:blip>
+          <a:stretch>
+            <a:fillRect/>
+          </a:stretch>
+        </p:blipFill>
+        <p:spPr>
+          <a:xfrm>
+            <a:off x="5584804" y="1371600"/>
+            <a:ext cx="1759694" cy="1645920"/>
+          </a:xfrm>
+          <a:prstGeom prst="rect">
+            <a:avLst/>
+          </a:prstGeom>
+        </p:spPr>
+      </p:pic>
+      <p:pic>
+        <p:nvPicPr>
+          <p:cNvPr id="8" name="Picture 7"/>
+          <p:cNvPicPr>
+            <a:picLocks noChangeAspect="1"/>
+          </p:cNvPicPr>
+          <p:nvPr/>
+        </p:nvPicPr>
+        <p:blipFill>
+          <a:blip r:embed="rId6" cstate="print">
+            <a:extLst>
+              <a:ext uri="{BEBA8EAE-BF5A-486C-A8C5-ECC9F3942E4B}">
+                <a14:imgProps xmlns:a14="http://schemas.microsoft.com/office/drawing/2010/main">
+                  <a14:imgLayer r:embed="rId7">
+                    <a14:imgEffect>
+                      <a14:backgroundRemoval t="10000" b="90000" l="10000" r="90000"/>
+                    </a14:imgEffect>
+                  </a14:imgLayer>
+                </a14:imgProps>
+              </a:ext>
+              <a:ext uri="{28A0092B-C50C-407E-A947-70E740481C1C}">
+                <a14:useLocalDpi xmlns:a14="http://schemas.microsoft.com/office/drawing/2010/main" val="0"/>
+              </a:ext>
+            </a:extLst>
+          </a:blip>
+          <a:stretch>
+            <a:fillRect/>
+          </a:stretch>
+        </p:blipFill>
+        <p:spPr>
+          <a:xfrm>
+            <a:off x="5631706" y="4678680"/>
+            <a:ext cx="1759694" cy="1645920"/>
+          </a:xfrm>
+          <a:prstGeom prst="rect">
+            <a:avLst/>
+          </a:prstGeom>
+        </p:spPr>
+      </p:pic>
+      <p:pic>
+        <p:nvPicPr>
+          <p:cNvPr id="9" name="Picture 8"/>
+          <p:cNvPicPr>
+            <a:picLocks noChangeAspect="1"/>
+          </p:cNvPicPr>
+          <p:nvPr/>
+        </p:nvPicPr>
+        <p:blipFill>
+          <a:blip r:embed="rId8" cstate="print">
+            <a:extLst>
+              <a:ext uri="{BEBA8EAE-BF5A-486C-A8C5-ECC9F3942E4B}">
+                <a14:imgProps xmlns:a14="http://schemas.microsoft.com/office/drawing/2010/main">
+                  <a14:imgLayer r:embed="rId9">
+                    <a14:imgEffect>
+                      <a14:backgroundRemoval t="10000" b="90000" l="10000" r="90000"/>
+                    </a14:imgEffect>
+                  </a14:imgLayer>
+                </a14:imgProps>
+              </a:ext>
+              <a:ext uri="{28A0092B-C50C-407E-A947-70E740481C1C}">
+                <a14:useLocalDpi xmlns:a14="http://schemas.microsoft.com/office/drawing/2010/main" val="0"/>
+              </a:ext>
+            </a:extLst>
+          </a:blip>
+          <a:stretch>
+            <a:fillRect/>
+          </a:stretch>
+        </p:blipFill>
+        <p:spPr>
+          <a:xfrm>
+            <a:off x="3200399" y="4678680"/>
+            <a:ext cx="1759694" cy="1645920"/>
+          </a:xfrm>
+          <a:prstGeom prst="rect">
+            <a:avLst/>
+          </a:prstGeom>
+        </p:spPr>
+      </p:pic>
+      <p:pic>
+        <p:nvPicPr>
+          <p:cNvPr id="10" name="Picture 9"/>
+          <p:cNvPicPr>
+            <a:picLocks noChangeAspect="1"/>
+          </p:cNvPicPr>
+          <p:nvPr/>
+        </p:nvPicPr>
+        <p:blipFill>
+          <a:blip r:embed="rId10" cstate="print">
+            <a:extLst>
+              <a:ext uri="{BEBA8EAE-BF5A-486C-A8C5-ECC9F3942E4B}">
+                <a14:imgProps xmlns:a14="http://schemas.microsoft.com/office/drawing/2010/main">
+                  <a14:imgLayer r:embed="rId11">
+                    <a14:imgEffect>
+                      <a14:backgroundRemoval t="10000" b="90000" l="10000" r="90000"/>
+                    </a14:imgEffect>
+                  </a14:imgLayer>
+                </a14:imgProps>
+              </a:ext>
+              <a:ext uri="{28A0092B-C50C-407E-A947-70E740481C1C}">
+                <a14:useLocalDpi xmlns:a14="http://schemas.microsoft.com/office/drawing/2010/main" val="0"/>
+              </a:ext>
+            </a:extLst>
+          </a:blip>
+          <a:stretch>
+            <a:fillRect/>
+          </a:stretch>
+        </p:blipFill>
+        <p:spPr>
+          <a:xfrm>
+            <a:off x="3193306" y="1325880"/>
+            <a:ext cx="1759694" cy="1645920"/>
+          </a:xfrm>
+          <a:prstGeom prst="rect">
+            <a:avLst/>
+          </a:prstGeom>
+        </p:spPr>
+      </p:pic>
+      <p:sp>
+        <p:nvSpPr>
+          <p:cNvPr id="11" name="TextBox 10"/>
+          <p:cNvSpPr txBox="1"/>
+          <p:nvPr/>
+        </p:nvSpPr>
+        <p:spPr>
+          <a:xfrm>
+            <a:off x="1143000" y="5249178"/>
+            <a:ext cx="1524000" cy="492443"/>
+          </a:xfrm>
+          <a:prstGeom prst="rect">
+            <a:avLst/>
+          </a:prstGeom>
+          <a:noFill/>
+        </p:spPr>
+        <p:txBody>
+          <a:bodyPr wrap="square" rtlCol="0">
+            <a:spAutoFit/>
+          </a:bodyPr>
+          <a:lstStyle/>
+          <a:p>
+            <a:r>
+              <a:rPr lang="en-US" sz="2600" b="1" dirty="0" smtClean="0"/>
+              <a:t>Negation</a:t>
+            </a:r>
+            <a:endParaRPr lang="en-US" sz="2600" b="1" dirty="0"/>
+          </a:p>
+        </p:txBody>
+      </p:sp>
+      <p:sp>
+        <p:nvSpPr>
+          <p:cNvPr id="12" name="TextBox 11"/>
+          <p:cNvSpPr txBox="1"/>
+          <p:nvPr/>
+        </p:nvSpPr>
+        <p:spPr>
+          <a:xfrm>
+            <a:off x="1066800" y="3559790"/>
+            <a:ext cx="1848886" cy="492443"/>
+          </a:xfrm>
+          <a:prstGeom prst="rect">
+            <a:avLst/>
+          </a:prstGeom>
+          <a:noFill/>
+        </p:spPr>
+        <p:txBody>
+          <a:bodyPr wrap="square" rtlCol="0">
+            <a:spAutoFit/>
+          </a:bodyPr>
+          <a:lstStyle/>
+          <a:p>
+            <a:r>
+              <a:rPr lang="en-US" sz="2600" b="1" dirty="0"/>
+              <a:t>Implicature</a:t>
+            </a:r>
+          </a:p>
+        </p:txBody>
+      </p:sp>
+      <p:sp>
+        <p:nvSpPr>
+          <p:cNvPr id="13" name="TextBox 12"/>
+          <p:cNvSpPr txBox="1"/>
+          <p:nvPr/>
+        </p:nvSpPr>
+        <p:spPr>
+          <a:xfrm>
+            <a:off x="1143000" y="1900535"/>
+            <a:ext cx="1828800" cy="492443"/>
+          </a:xfrm>
+          <a:prstGeom prst="rect">
+            <a:avLst/>
+          </a:prstGeom>
+          <a:noFill/>
+        </p:spPr>
+        <p:txBody>
+          <a:bodyPr wrap="square" rtlCol="0">
+            <a:spAutoFit/>
+          </a:bodyPr>
+          <a:lstStyle/>
+          <a:p>
+            <a:r>
+              <a:rPr lang="en-US" sz="2600" b="1" dirty="0" smtClean="0"/>
+              <a:t>Inhibition</a:t>
+            </a:r>
+            <a:endParaRPr lang="en-US" sz="2600" b="1" dirty="0" smtClean="0"/>
+          </a:p>
+        </p:txBody>
+      </p:sp>
+      <p:pic>
+        <p:nvPicPr>
+          <p:cNvPr id="17" name="Content Placeholder 16"/>
+          <p:cNvPicPr>
+            <a:picLocks noGrp="1" noChangeAspect="1"/>
+          </p:cNvPicPr>
+          <p:nvPr>
+            <p:ph idx="1"/>
+          </p:nvPr>
+        </p:nvPicPr>
+        <p:blipFill>
+          <a:blip r:embed="rId12" cstate="print">
+            <a:extLst>
+              <a:ext uri="{BEBA8EAE-BF5A-486C-A8C5-ECC9F3942E4B}">
+                <a14:imgProps xmlns:a14="http://schemas.microsoft.com/office/drawing/2010/main">
+                  <a14:imgLayer r:embed="rId13">
+                    <a14:imgEffect>
+                      <a14:backgroundRemoval t="9908" b="97926" l="2371" r="94612">
+                        <a14:foregroundMark x1="74353" y1="34332" x2="74353" y2="34332"/>
+                        <a14:foregroundMark x1="33405" y1="29493" x2="33405" y2="29493"/>
+                        <a14:foregroundMark x1="35560" y1="33641" x2="35560" y2="33641"/>
+                        <a14:foregroundMark x1="34698" y1="46774" x2="34698" y2="46774"/>
+                        <a14:foregroundMark x1="35345" y1="42166" x2="35345" y2="42166"/>
+                        <a14:foregroundMark x1="35129" y1="40553" x2="35129" y2="40553"/>
+                        <a14:foregroundMark x1="39655" y1="44470" x2="39655" y2="44470"/>
+                        <a14:foregroundMark x1="23060" y1="59908" x2="23060" y2="59908"/>
+                        <a14:foregroundMark x1="29957" y1="69355" x2="29957" y2="69355"/>
+                        <a14:foregroundMark x1="6034" y1="68203" x2="6034" y2="68203"/>
+                        <a14:foregroundMark x1="6250" y1="65207" x2="6250" y2="65207"/>
+                        <a14:foregroundMark x1="18750" y1="59217" x2="18750" y2="59217"/>
+                        <a14:foregroundMark x1="29526" y1="52074" x2="29526" y2="52074"/>
+                      </a14:backgroundRemoval>
+                    </a14:imgEffect>
+                  </a14:imgLayer>
+                </a14:imgProps>
+              </a:ext>
+              <a:ext uri="{28A0092B-C50C-407E-A947-70E740481C1C}">
+                <a14:useLocalDpi xmlns:a14="http://schemas.microsoft.com/office/drawing/2010/main" val="0"/>
+              </a:ext>
+            </a:extLst>
+          </a:blip>
+          <a:stretch>
+            <a:fillRect/>
+          </a:stretch>
+        </p:blipFill>
+        <p:spPr>
+          <a:xfrm>
+            <a:off x="5707906" y="3002280"/>
+            <a:ext cx="1759694" cy="1645920"/>
+          </a:xfrm>
+        </p:spPr>
+      </p:pic>
+    </p:spTree>
+    <p:extLst>
+      <p:ext uri="{BB962C8B-B14F-4D97-AF65-F5344CB8AC3E}">
+        <p14:creationId xmlns:p14="http://schemas.microsoft.com/office/powerpoint/2010/main" val="679354099"/>
+      </p:ext>
+    </p:extLst>
+  </p:cSld>
+  <p:clrMapOvr>
+    <a:masterClrMapping/>
+  </p:clrMapOvr>
+  <p:timing>
+    <p:tnLst>
+      <p:par>
+        <p:cTn id="1" dur="indefinite" restart="never" nodeType="tmRoot"/>
+      </p:par>
+    </p:tnLst>
+  </p:timing>
+</p:sld>
+</file>
+
+<file path=ppt/slides/slide7.xml><?xml version="1.0" encoding="utf-8"?>
 <p:sld xmlns:a="http://schemas.openxmlformats.org/drawingml/2006/main" xmlns:r="http://schemas.openxmlformats.org/officeDocument/2006/relationships" xmlns:p="http://schemas.openxmlformats.org/presentationml/2006/main">
   <p:cSld>
     <p:spTree>
@@ -9266,640 +10082,6 @@
 </p:sld>
 </file>
 
-<file path=ppt/slides/slide6.xml><?xml version="1.0" encoding="utf-8"?>
-<p:sld xmlns:a="http://schemas.openxmlformats.org/drawingml/2006/main" xmlns:r="http://schemas.openxmlformats.org/officeDocument/2006/relationships" xmlns:p="http://schemas.openxmlformats.org/presentationml/2006/main">
-  <p:cSld>
-    <p:spTree>
-      <p:nvGrpSpPr>
-        <p:cNvPr id="1" name=""/>
-        <p:cNvGrpSpPr/>
-        <p:nvPr/>
-      </p:nvGrpSpPr>
-      <p:grpSpPr>
-        <a:xfrm>
-          <a:off x="0" y="0"/>
-          <a:ext cx="0" cy="0"/>
-          <a:chOff x="0" y="0"/>
-          <a:chExt cx="0" cy="0"/>
-        </a:xfrm>
-      </p:grpSpPr>
-      <p:sp>
-        <p:nvSpPr>
-          <p:cNvPr id="16" name="Rounded Rectangle 15"/>
-          <p:cNvSpPr/>
-          <p:nvPr/>
-        </p:nvSpPr>
-        <p:spPr>
-          <a:xfrm>
-            <a:off x="762000" y="4722167"/>
-            <a:ext cx="7696200" cy="1524000"/>
-          </a:xfrm>
-          <a:prstGeom prst="roundRect">
-            <a:avLst/>
-          </a:prstGeom>
-          <a:solidFill>
-            <a:schemeClr val="accent2">
-              <a:lumMod val="40000"/>
-              <a:lumOff val="60000"/>
-            </a:schemeClr>
-          </a:solidFill>
-        </p:spPr>
-        <p:style>
-          <a:lnRef idx="2">
-            <a:schemeClr val="accent1">
-              <a:shade val="50000"/>
-            </a:schemeClr>
-          </a:lnRef>
-          <a:fillRef idx="1">
-            <a:schemeClr val="accent1"/>
-          </a:fillRef>
-          <a:effectRef idx="0">
-            <a:schemeClr val="accent1"/>
-          </a:effectRef>
-          <a:fontRef idx="minor">
-            <a:schemeClr val="lt1"/>
-          </a:fontRef>
-        </p:style>
-        <p:txBody>
-          <a:bodyPr rtlCol="0" anchor="ctr"/>
-          <a:lstStyle/>
-          <a:p>
-            <a:pPr algn="ctr"/>
-            <a:endParaRPr lang="en-US"/>
-          </a:p>
-        </p:txBody>
-      </p:sp>
-      <p:sp>
-        <p:nvSpPr>
-          <p:cNvPr id="15" name="Rounded Rectangle 14"/>
-          <p:cNvSpPr/>
-          <p:nvPr/>
-        </p:nvSpPr>
-        <p:spPr>
-          <a:xfrm>
-            <a:off x="762000" y="3048000"/>
-            <a:ext cx="7696200" cy="1524000"/>
-          </a:xfrm>
-          <a:prstGeom prst="roundRect">
-            <a:avLst/>
-          </a:prstGeom>
-          <a:solidFill>
-            <a:schemeClr val="accent3">
-              <a:lumMod val="60000"/>
-              <a:lumOff val="40000"/>
-            </a:schemeClr>
-          </a:solidFill>
-        </p:spPr>
-        <p:style>
-          <a:lnRef idx="2">
-            <a:schemeClr val="accent1">
-              <a:shade val="50000"/>
-            </a:schemeClr>
-          </a:lnRef>
-          <a:fillRef idx="1">
-            <a:schemeClr val="accent1"/>
-          </a:fillRef>
-          <a:effectRef idx="0">
-            <a:schemeClr val="accent1"/>
-          </a:effectRef>
-          <a:fontRef idx="minor">
-            <a:schemeClr val="lt1"/>
-          </a:fontRef>
-        </p:style>
-        <p:txBody>
-          <a:bodyPr rtlCol="0" anchor="ctr"/>
-          <a:lstStyle/>
-          <a:p>
-            <a:pPr algn="ctr"/>
-            <a:endParaRPr lang="en-US"/>
-          </a:p>
-        </p:txBody>
-      </p:sp>
-      <p:sp>
-        <p:nvSpPr>
-          <p:cNvPr id="14" name="Rounded Rectangle 13"/>
-          <p:cNvSpPr/>
-          <p:nvPr/>
-        </p:nvSpPr>
-        <p:spPr>
-          <a:xfrm>
-            <a:off x="762000" y="1371600"/>
-            <a:ext cx="7696200" cy="1524000"/>
-          </a:xfrm>
-          <a:prstGeom prst="roundRect">
-            <a:avLst/>
-          </a:prstGeom>
-          <a:solidFill>
-            <a:schemeClr val="accent4">
-              <a:lumMod val="40000"/>
-              <a:lumOff val="60000"/>
-            </a:schemeClr>
-          </a:solidFill>
-        </p:spPr>
-        <p:style>
-          <a:lnRef idx="2">
-            <a:schemeClr val="accent1">
-              <a:shade val="50000"/>
-            </a:schemeClr>
-          </a:lnRef>
-          <a:fillRef idx="1">
-            <a:schemeClr val="accent1"/>
-          </a:fillRef>
-          <a:effectRef idx="0">
-            <a:schemeClr val="accent1"/>
-          </a:effectRef>
-          <a:fontRef idx="minor">
-            <a:schemeClr val="lt1"/>
-          </a:fontRef>
-        </p:style>
-        <p:txBody>
-          <a:bodyPr rtlCol="0" anchor="ctr"/>
-          <a:lstStyle/>
-          <a:p>
-            <a:pPr algn="ctr"/>
-            <a:endParaRPr lang="en-US"/>
-          </a:p>
-        </p:txBody>
-      </p:sp>
-      <p:sp>
-        <p:nvSpPr>
-          <p:cNvPr id="2" name="Title 1"/>
-          <p:cNvSpPr>
-            <a:spLocks noGrp="1"/>
-          </p:cNvSpPr>
-          <p:nvPr>
-            <p:ph type="title"/>
-          </p:nvPr>
-        </p:nvSpPr>
-        <p:spPr/>
-        <p:txBody>
-          <a:bodyPr>
-            <a:normAutofit/>
-          </a:bodyPr>
-          <a:lstStyle/>
-          <a:p>
-            <a:r>
-              <a:rPr lang="en-US" dirty="0" smtClean="0"/>
-              <a:t>Experiment Phases</a:t>
-            </a:r>
-            <a:endParaRPr lang="en-US" dirty="0"/>
-          </a:p>
-        </p:txBody>
-      </p:sp>
-      <p:pic>
-        <p:nvPicPr>
-          <p:cNvPr id="4" name="Content Placeholder 3"/>
-          <p:cNvPicPr>
-            <a:picLocks noGrp="1" noChangeAspect="1"/>
-          </p:cNvPicPr>
-          <p:nvPr>
-            <p:ph idx="1"/>
-          </p:nvPr>
-        </p:nvPicPr>
-        <p:blipFill>
-          <a:blip r:embed="rId2" cstate="print">
-            <a:extLst>
-              <a:ext uri="{BEBA8EAE-BF5A-486C-A8C5-ECC9F3942E4B}">
-                <a14:imgProps xmlns:a14="http://schemas.microsoft.com/office/drawing/2010/main">
-                  <a14:imgLayer r:embed="rId3">
-                    <a14:imgEffect>
-                      <a14:backgroundRemoval t="23907" b="77843" l="4905" r="92916">
-                        <a14:foregroundMark x1="70845" y1="56560" x2="70845" y2="56560"/>
-                        <a14:foregroundMark x1="72752" y1="39650" x2="72752" y2="39650"/>
-                        <a14:foregroundMark x1="72752" y1="42274" x2="72752" y2="42274"/>
-                        <a14:foregroundMark x1="73025" y1="44898" x2="73025" y2="44898"/>
-                        <a14:foregroundMark x1="66213" y1="33819" x2="66213" y2="33819"/>
-                        <a14:foregroundMark x1="51771" y1="29446" x2="51771" y2="29446"/>
-                        <a14:foregroundMark x1="85831" y1="42274" x2="85831" y2="42274"/>
-                        <a14:foregroundMark x1="85014" y1="55685" x2="85014" y2="55685"/>
-                      </a14:backgroundRemoval>
-                    </a14:imgEffect>
-                  </a14:imgLayer>
-                </a14:imgProps>
-              </a:ext>
-              <a:ext uri="{28A0092B-C50C-407E-A947-70E740481C1C}">
-                <a14:useLocalDpi xmlns:a14="http://schemas.microsoft.com/office/drawing/2010/main" val="0"/>
-              </a:ext>
-            </a:extLst>
-          </a:blip>
-          <a:stretch>
-            <a:fillRect/>
-          </a:stretch>
-        </p:blipFill>
-        <p:spPr>
-          <a:xfrm>
-            <a:off x="2895600" y="1325880"/>
-            <a:ext cx="1759694" cy="1645920"/>
-          </a:xfrm>
-        </p:spPr>
-      </p:pic>
-      <p:pic>
-        <p:nvPicPr>
-          <p:cNvPr id="5" name="Picture 4"/>
-          <p:cNvPicPr>
-            <a:picLocks noChangeAspect="1"/>
-          </p:cNvPicPr>
-          <p:nvPr/>
-        </p:nvPicPr>
-        <p:blipFill>
-          <a:blip r:embed="rId4" cstate="print">
-            <a:extLst>
-              <a:ext uri="{BEBA8EAE-BF5A-486C-A8C5-ECC9F3942E4B}">
-                <a14:imgProps xmlns:a14="http://schemas.microsoft.com/office/drawing/2010/main">
-                  <a14:imgLayer r:embed="rId5">
-                    <a14:imgEffect>
-                      <a14:backgroundRemoval t="10000" b="90000" l="10000" r="90000"/>
-                    </a14:imgEffect>
-                  </a14:imgLayer>
-                </a14:imgProps>
-              </a:ext>
-              <a:ext uri="{28A0092B-C50C-407E-A947-70E740481C1C}">
-                <a14:useLocalDpi xmlns:a14="http://schemas.microsoft.com/office/drawing/2010/main" val="0"/>
-              </a:ext>
-            </a:extLst>
-          </a:blip>
-          <a:stretch>
-            <a:fillRect/>
-          </a:stretch>
-        </p:blipFill>
-        <p:spPr>
-          <a:xfrm>
-            <a:off x="4869706" y="1371600"/>
-            <a:ext cx="1759694" cy="1645920"/>
-          </a:xfrm>
-          <a:prstGeom prst="rect">
-            <a:avLst/>
-          </a:prstGeom>
-        </p:spPr>
-      </p:pic>
-      <p:pic>
-        <p:nvPicPr>
-          <p:cNvPr id="6" name="Picture 5"/>
-          <p:cNvPicPr>
-            <a:picLocks noChangeAspect="1"/>
-          </p:cNvPicPr>
-          <p:nvPr/>
-        </p:nvPicPr>
-        <p:blipFill>
-          <a:blip r:embed="rId6" cstate="print">
-            <a:extLst>
-              <a:ext uri="{BEBA8EAE-BF5A-486C-A8C5-ECC9F3942E4B}">
-                <a14:imgProps xmlns:a14="http://schemas.microsoft.com/office/drawing/2010/main">
-                  <a14:imgLayer r:embed="rId7">
-                    <a14:imgEffect>
-                      <a14:backgroundRemoval t="10000" b="90000" l="10000" r="90000"/>
-                    </a14:imgEffect>
-                  </a14:imgLayer>
-                </a14:imgProps>
-              </a:ext>
-              <a:ext uri="{28A0092B-C50C-407E-A947-70E740481C1C}">
-                <a14:useLocalDpi xmlns:a14="http://schemas.microsoft.com/office/drawing/2010/main" val="0"/>
-              </a:ext>
-            </a:extLst>
-          </a:blip>
-          <a:stretch>
-            <a:fillRect/>
-          </a:stretch>
-        </p:blipFill>
-        <p:spPr>
-          <a:xfrm>
-            <a:off x="3200399" y="3002280"/>
-            <a:ext cx="1759694" cy="1645920"/>
-          </a:xfrm>
-          <a:prstGeom prst="rect">
-            <a:avLst/>
-          </a:prstGeom>
-        </p:spPr>
-      </p:pic>
-      <p:pic>
-        <p:nvPicPr>
-          <p:cNvPr id="7" name="Picture 6"/>
-          <p:cNvPicPr>
-            <a:picLocks noChangeAspect="1"/>
-          </p:cNvPicPr>
-          <p:nvPr/>
-        </p:nvPicPr>
-        <p:blipFill>
-          <a:blip r:embed="rId8" cstate="print">
-            <a:extLst>
-              <a:ext uri="{BEBA8EAE-BF5A-486C-A8C5-ECC9F3942E4B}">
-                <a14:imgProps xmlns:a14="http://schemas.microsoft.com/office/drawing/2010/main">
-                  <a14:imgLayer r:embed="rId9">
-                    <a14:imgEffect>
-                      <a14:backgroundRemoval t="10000" b="90000" l="10000" r="90000"/>
-                    </a14:imgEffect>
-                  </a14:imgLayer>
-                </a14:imgProps>
-              </a:ext>
-              <a:ext uri="{28A0092B-C50C-407E-A947-70E740481C1C}">
-                <a14:useLocalDpi xmlns:a14="http://schemas.microsoft.com/office/drawing/2010/main" val="0"/>
-              </a:ext>
-            </a:extLst>
-          </a:blip>
-          <a:stretch>
-            <a:fillRect/>
-          </a:stretch>
-        </p:blipFill>
-        <p:spPr>
-          <a:xfrm>
-            <a:off x="5631706" y="3002280"/>
-            <a:ext cx="1759694" cy="1645920"/>
-          </a:xfrm>
-          <a:prstGeom prst="rect">
-            <a:avLst/>
-          </a:prstGeom>
-        </p:spPr>
-      </p:pic>
-      <p:pic>
-        <p:nvPicPr>
-          <p:cNvPr id="8" name="Picture 7"/>
-          <p:cNvPicPr>
-            <a:picLocks noChangeAspect="1"/>
-          </p:cNvPicPr>
-          <p:nvPr/>
-        </p:nvPicPr>
-        <p:blipFill>
-          <a:blip r:embed="rId10" cstate="print">
-            <a:extLst>
-              <a:ext uri="{BEBA8EAE-BF5A-486C-A8C5-ECC9F3942E4B}">
-                <a14:imgProps xmlns:a14="http://schemas.microsoft.com/office/drawing/2010/main">
-                  <a14:imgLayer r:embed="rId11">
-                    <a14:imgEffect>
-                      <a14:backgroundRemoval t="10000" b="90000" l="10000" r="90000"/>
-                    </a14:imgEffect>
-                  </a14:imgLayer>
-                </a14:imgProps>
-              </a:ext>
-              <a:ext uri="{28A0092B-C50C-407E-A947-70E740481C1C}">
-                <a14:useLocalDpi xmlns:a14="http://schemas.microsoft.com/office/drawing/2010/main" val="0"/>
-              </a:ext>
-            </a:extLst>
-          </a:blip>
-          <a:stretch>
-            <a:fillRect/>
-          </a:stretch>
-        </p:blipFill>
-        <p:spPr>
-          <a:xfrm>
-            <a:off x="5631706" y="4678680"/>
-            <a:ext cx="1759694" cy="1645920"/>
-          </a:xfrm>
-          <a:prstGeom prst="rect">
-            <a:avLst/>
-          </a:prstGeom>
-        </p:spPr>
-      </p:pic>
-      <p:pic>
-        <p:nvPicPr>
-          <p:cNvPr id="9" name="Picture 8"/>
-          <p:cNvPicPr>
-            <a:picLocks noChangeAspect="1"/>
-          </p:cNvPicPr>
-          <p:nvPr/>
-        </p:nvPicPr>
-        <p:blipFill>
-          <a:blip r:embed="rId12" cstate="print">
-            <a:extLst>
-              <a:ext uri="{BEBA8EAE-BF5A-486C-A8C5-ECC9F3942E4B}">
-                <a14:imgProps xmlns:a14="http://schemas.microsoft.com/office/drawing/2010/main">
-                  <a14:imgLayer r:embed="rId13">
-                    <a14:imgEffect>
-                      <a14:backgroundRemoval t="10000" b="90000" l="10000" r="90000"/>
-                    </a14:imgEffect>
-                  </a14:imgLayer>
-                </a14:imgProps>
-              </a:ext>
-              <a:ext uri="{28A0092B-C50C-407E-A947-70E740481C1C}">
-                <a14:useLocalDpi xmlns:a14="http://schemas.microsoft.com/office/drawing/2010/main" val="0"/>
-              </a:ext>
-            </a:extLst>
-          </a:blip>
-          <a:stretch>
-            <a:fillRect/>
-          </a:stretch>
-        </p:blipFill>
-        <p:spPr>
-          <a:xfrm>
-            <a:off x="3200399" y="4678680"/>
-            <a:ext cx="1759694" cy="1645920"/>
-          </a:xfrm>
-          <a:prstGeom prst="rect">
-            <a:avLst/>
-          </a:prstGeom>
-        </p:spPr>
-      </p:pic>
-      <p:pic>
-        <p:nvPicPr>
-          <p:cNvPr id="10" name="Picture 9"/>
-          <p:cNvPicPr>
-            <a:picLocks noChangeAspect="1"/>
-          </p:cNvPicPr>
-          <p:nvPr/>
-        </p:nvPicPr>
-        <p:blipFill>
-          <a:blip r:embed="rId14" cstate="print">
-            <a:extLst>
-              <a:ext uri="{BEBA8EAE-BF5A-486C-A8C5-ECC9F3942E4B}">
-                <a14:imgProps xmlns:a14="http://schemas.microsoft.com/office/drawing/2010/main">
-                  <a14:imgLayer r:embed="rId15">
-                    <a14:imgEffect>
-                      <a14:backgroundRemoval t="10000" b="90000" l="10000" r="90000"/>
-                    </a14:imgEffect>
-                  </a14:imgLayer>
-                </a14:imgProps>
-              </a:ext>
-              <a:ext uri="{28A0092B-C50C-407E-A947-70E740481C1C}">
-                <a14:useLocalDpi xmlns:a14="http://schemas.microsoft.com/office/drawing/2010/main" val="0"/>
-              </a:ext>
-            </a:extLst>
-          </a:blip>
-          <a:stretch>
-            <a:fillRect/>
-          </a:stretch>
-        </p:blipFill>
-        <p:spPr>
-          <a:xfrm>
-            <a:off x="6469906" y="1325880"/>
-            <a:ext cx="1759694" cy="1645920"/>
-          </a:xfrm>
-          <a:prstGeom prst="rect">
-            <a:avLst/>
-          </a:prstGeom>
-        </p:spPr>
-      </p:pic>
-      <p:sp>
-        <p:nvSpPr>
-          <p:cNvPr id="11" name="TextBox 10"/>
-          <p:cNvSpPr txBox="1"/>
-          <p:nvPr/>
-        </p:nvSpPr>
-        <p:spPr>
-          <a:xfrm>
-            <a:off x="1143000" y="5249178"/>
-            <a:ext cx="1524000" cy="492443"/>
-          </a:xfrm>
-          <a:prstGeom prst="rect">
-            <a:avLst/>
-          </a:prstGeom>
-          <a:noFill/>
-        </p:spPr>
-        <p:txBody>
-          <a:bodyPr wrap="square" rtlCol="0">
-            <a:spAutoFit/>
-          </a:bodyPr>
-          <a:lstStyle/>
-          <a:p>
-            <a:r>
-              <a:rPr lang="en-US" sz="2600" b="1" dirty="0" smtClean="0"/>
-              <a:t>Negation</a:t>
-            </a:r>
-            <a:endParaRPr lang="en-US" sz="2600" b="1" dirty="0"/>
-          </a:p>
-        </p:txBody>
-      </p:sp>
-      <p:sp>
-        <p:nvSpPr>
-          <p:cNvPr id="12" name="TextBox 11"/>
-          <p:cNvSpPr txBox="1"/>
-          <p:nvPr/>
-        </p:nvSpPr>
-        <p:spPr>
-          <a:xfrm>
-            <a:off x="1122914" y="3559790"/>
-            <a:ext cx="1620286" cy="492443"/>
-          </a:xfrm>
-          <a:prstGeom prst="rect">
-            <a:avLst/>
-          </a:prstGeom>
-          <a:noFill/>
-        </p:spPr>
-        <p:txBody>
-          <a:bodyPr wrap="square" rtlCol="0">
-            <a:spAutoFit/>
-          </a:bodyPr>
-          <a:lstStyle/>
-          <a:p>
-            <a:r>
-              <a:rPr lang="en-US" sz="2600" b="1" dirty="0" smtClean="0"/>
-              <a:t>Inhibition</a:t>
-            </a:r>
-          </a:p>
-        </p:txBody>
-      </p:sp>
-      <p:sp>
-        <p:nvSpPr>
-          <p:cNvPr id="13" name="TextBox 12"/>
-          <p:cNvSpPr txBox="1"/>
-          <p:nvPr/>
-        </p:nvSpPr>
-        <p:spPr>
-          <a:xfrm>
-            <a:off x="990600" y="1900535"/>
-            <a:ext cx="1828800" cy="492443"/>
-          </a:xfrm>
-          <a:prstGeom prst="rect">
-            <a:avLst/>
-          </a:prstGeom>
-          <a:noFill/>
-        </p:spPr>
-        <p:txBody>
-          <a:bodyPr wrap="square" rtlCol="0">
-            <a:spAutoFit/>
-          </a:bodyPr>
-          <a:lstStyle/>
-          <a:p>
-            <a:r>
-              <a:rPr lang="en-US" sz="2600" b="1" dirty="0" smtClean="0"/>
-              <a:t>Implicature</a:t>
-            </a:r>
-          </a:p>
-        </p:txBody>
-      </p:sp>
-    </p:spTree>
-    <p:extLst>
-      <p:ext uri="{BB962C8B-B14F-4D97-AF65-F5344CB8AC3E}">
-        <p14:creationId xmlns:p14="http://schemas.microsoft.com/office/powerpoint/2010/main" val="679354099"/>
-      </p:ext>
-    </p:extLst>
-  </p:cSld>
-  <p:clrMapOvr>
-    <a:masterClrMapping/>
-  </p:clrMapOvr>
-  <p:timing>
-    <p:tnLst>
-      <p:par>
-        <p:cTn id="1" dur="indefinite" restart="never" nodeType="tmRoot"/>
-      </p:par>
-    </p:tnLst>
-  </p:timing>
-</p:sld>
-</file>
-
-<file path=ppt/slides/slide7.xml><?xml version="1.0" encoding="utf-8"?>
-<p:sld xmlns:a="http://schemas.openxmlformats.org/drawingml/2006/main" xmlns:r="http://schemas.openxmlformats.org/officeDocument/2006/relationships" xmlns:p="http://schemas.openxmlformats.org/presentationml/2006/main">
-  <p:cSld>
-    <p:spTree>
-      <p:nvGrpSpPr>
-        <p:cNvPr id="1" name=""/>
-        <p:cNvGrpSpPr/>
-        <p:nvPr/>
-      </p:nvGrpSpPr>
-      <p:grpSpPr>
-        <a:xfrm>
-          <a:off x="0" y="0"/>
-          <a:ext cx="0" cy="0"/>
-          <a:chOff x="0" y="0"/>
-          <a:chExt cx="0" cy="0"/>
-        </a:xfrm>
-      </p:grpSpPr>
-      <p:pic>
-        <p:nvPicPr>
-          <p:cNvPr id="4" name="Content Placeholder 3"/>
-          <p:cNvPicPr>
-            <a:picLocks noGrp="1" noChangeAspect="1"/>
-          </p:cNvPicPr>
-          <p:nvPr>
-            <p:ph idx="4294967295"/>
-          </p:nvPr>
-        </p:nvPicPr>
-        <p:blipFill rotWithShape="1">
-          <a:blip r:embed="rId2">
-            <a:extLst>
-              <a:ext uri="{28A0092B-C50C-407E-A947-70E740481C1C}">
-                <a14:useLocalDpi xmlns:a14="http://schemas.microsoft.com/office/drawing/2010/main" val="0"/>
-              </a:ext>
-            </a:extLst>
-          </a:blip>
-          <a:srcRect l="18798" r="19002" b="3579"/>
-          <a:stretch/>
-        </p:blipFill>
-        <p:spPr>
-          <a:xfrm>
-            <a:off x="1181100" y="357482"/>
-            <a:ext cx="6781800" cy="6195718"/>
-          </a:xfrm>
-        </p:spPr>
-      </p:pic>
-    </p:spTree>
-    <p:extLst>
-      <p:ext uri="{BB962C8B-B14F-4D97-AF65-F5344CB8AC3E}">
-        <p14:creationId xmlns:p14="http://schemas.microsoft.com/office/powerpoint/2010/main" val="2002289379"/>
-      </p:ext>
-    </p:extLst>
-  </p:cSld>
-  <p:clrMapOvr>
-    <a:masterClrMapping/>
-  </p:clrMapOvr>
-  <p:timing>
-    <p:tnLst>
-      <p:par>
-        <p:cTn id="1" dur="indefinite" restart="never" nodeType="tmRoot"/>
-      </p:par>
-    </p:tnLst>
-  </p:timing>
-</p:sld>
-</file>
-
 <file path=ppt/slides/slide8.xml><?xml version="1.0" encoding="utf-8"?>
 <p:sld xmlns:a="http://schemas.openxmlformats.org/drawingml/2006/main" xmlns:r="http://schemas.openxmlformats.org/officeDocument/2006/relationships" xmlns:p="http://schemas.openxmlformats.org/presentationml/2006/main">
   <p:cSld>
@@ -9934,7 +10116,7 @@
           <a:p>
             <a:r>
               <a:rPr lang="en-US" dirty="0" smtClean="0"/>
-              <a:t>Adult’s Results</a:t>
+              <a:t>Kid’s Sample Video</a:t>
             </a:r>
             <a:endParaRPr lang="en-US" dirty="0"/>
           </a:p>
@@ -9957,33 +10139,7 @@
           <a:p>
             <a:r>
               <a:rPr lang="en-US" dirty="0" smtClean="0"/>
-              <a:t>“General RT &amp; Accuracy Data”</a:t>
-            </a:r>
-          </a:p>
-          <a:p>
-            <a:r>
-              <a:rPr lang="en-US" dirty="0" smtClean="0"/>
-              <a:t>Correlation of </a:t>
-            </a:r>
-            <a:r>
-              <a:rPr lang="en-US" dirty="0" err="1" smtClean="0"/>
-              <a:t>Inhib</a:t>
-            </a:r>
-            <a:r>
-              <a:rPr lang="en-US" dirty="0" smtClean="0"/>
-              <a:t> to 1) </a:t>
-            </a:r>
-            <a:r>
-              <a:rPr lang="en-US" dirty="0" err="1" smtClean="0"/>
-              <a:t>Neg</a:t>
-            </a:r>
-            <a:r>
-              <a:rPr lang="en-US" dirty="0" smtClean="0"/>
-              <a:t> &amp; 2) </a:t>
-            </a:r>
-            <a:r>
-              <a:rPr lang="en-US" dirty="0" err="1" smtClean="0"/>
-              <a:t>Implic</a:t>
+              <a:t>FIND VIDEO THAT SHOWS KID PLAYING GAME</a:t>
             </a:r>
             <a:endParaRPr lang="en-US" dirty="0"/>
           </a:p>
@@ -9992,7 +10148,7 @@
     </p:spTree>
     <p:extLst>
       <p:ext uri="{BB962C8B-B14F-4D97-AF65-F5344CB8AC3E}">
-        <p14:creationId xmlns:p14="http://schemas.microsoft.com/office/powerpoint/2010/main" val="122498930"/>
+        <p14:creationId xmlns:p14="http://schemas.microsoft.com/office/powerpoint/2010/main" val="1937707095"/>
       </p:ext>
     </p:extLst>
   </p:cSld>
@@ -10043,7 +10199,7 @@
           <a:p>
             <a:r>
               <a:rPr lang="en-US" dirty="0" smtClean="0"/>
-              <a:t>Kid’s Sample Video</a:t>
+              <a:t>Accuracy</a:t>
             </a:r>
             <a:endParaRPr lang="en-US" dirty="0"/>
           </a:p>
@@ -10066,16 +10222,24 @@
           <a:p>
             <a:r>
               <a:rPr lang="en-US" dirty="0" smtClean="0"/>
-              <a:t>FIND VIDEO THAT SHOWS KID PLAYING GAME</a:t>
-            </a:r>
-            <a:endParaRPr lang="en-US" dirty="0"/>
+              <a:t>Accuracy </a:t>
+            </a:r>
+            <a:r>
+              <a:rPr lang="en-US" dirty="0" smtClean="0"/>
+              <a:t>Data</a:t>
+            </a:r>
+            <a:r>
+              <a:rPr lang="en-US" dirty="0" smtClean="0"/>
+              <a:t>” side-by-side</a:t>
+            </a:r>
+            <a:endParaRPr lang="en-US" dirty="0" smtClean="0"/>
           </a:p>
         </p:txBody>
       </p:sp>
     </p:spTree>
     <p:extLst>
       <p:ext uri="{BB962C8B-B14F-4D97-AF65-F5344CB8AC3E}">
-        <p14:creationId xmlns:p14="http://schemas.microsoft.com/office/powerpoint/2010/main" val="1937707095"/>
+        <p14:creationId xmlns:p14="http://schemas.microsoft.com/office/powerpoint/2010/main" val="122498930"/>
       </p:ext>
     </p:extLst>
   </p:cSld>

</xml_diff>